<commit_message>
NorESM uses historical data in this commit - will fix next
</commit_message>
<xml_diff>
--- a/Illustrative_Figures/Combination_43_v3a.pptx
+++ b/Illustrative_Figures/Combination_43_v3a.pptx
@@ -245,7 +245,7 @@
           <a:p>
             <a:fld id="{93E6349B-033D-F544-9B2B-DA796A3C1F03}" type="datetimeFigureOut">
               <a:rPr lang="en-US" smtClean="0"/>
-              <a:t>1/1/25</a:t>
+              <a:t>3/24/25</a:t>
             </a:fld>
             <a:endParaRPr lang="en-US"/>
           </a:p>
@@ -415,7 +415,7 @@
           <a:p>
             <a:fld id="{93E6349B-033D-F544-9B2B-DA796A3C1F03}" type="datetimeFigureOut">
               <a:rPr lang="en-US" smtClean="0"/>
-              <a:t>1/1/25</a:t>
+              <a:t>3/24/25</a:t>
             </a:fld>
             <a:endParaRPr lang="en-US"/>
           </a:p>
@@ -595,7 +595,7 @@
           <a:p>
             <a:fld id="{93E6349B-033D-F544-9B2B-DA796A3C1F03}" type="datetimeFigureOut">
               <a:rPr lang="en-US" smtClean="0"/>
-              <a:t>1/1/25</a:t>
+              <a:t>3/24/25</a:t>
             </a:fld>
             <a:endParaRPr lang="en-US"/>
           </a:p>
@@ -765,7 +765,7 @@
           <a:p>
             <a:fld id="{93E6349B-033D-F544-9B2B-DA796A3C1F03}" type="datetimeFigureOut">
               <a:rPr lang="en-US" smtClean="0"/>
-              <a:t>1/1/25</a:t>
+              <a:t>3/24/25</a:t>
             </a:fld>
             <a:endParaRPr lang="en-US"/>
           </a:p>
@@ -1009,7 +1009,7 @@
           <a:p>
             <a:fld id="{93E6349B-033D-F544-9B2B-DA796A3C1F03}" type="datetimeFigureOut">
               <a:rPr lang="en-US" smtClean="0"/>
-              <a:t>1/1/25</a:t>
+              <a:t>3/24/25</a:t>
             </a:fld>
             <a:endParaRPr lang="en-US"/>
           </a:p>
@@ -1241,7 +1241,7 @@
           <a:p>
             <a:fld id="{93E6349B-033D-F544-9B2B-DA796A3C1F03}" type="datetimeFigureOut">
               <a:rPr lang="en-US" smtClean="0"/>
-              <a:t>1/1/25</a:t>
+              <a:t>3/24/25</a:t>
             </a:fld>
             <a:endParaRPr lang="en-US"/>
           </a:p>
@@ -1608,7 +1608,7 @@
           <a:p>
             <a:fld id="{93E6349B-033D-F544-9B2B-DA796A3C1F03}" type="datetimeFigureOut">
               <a:rPr lang="en-US" smtClean="0"/>
-              <a:t>1/1/25</a:t>
+              <a:t>3/24/25</a:t>
             </a:fld>
             <a:endParaRPr lang="en-US"/>
           </a:p>
@@ -1726,7 +1726,7 @@
           <a:p>
             <a:fld id="{93E6349B-033D-F544-9B2B-DA796A3C1F03}" type="datetimeFigureOut">
               <a:rPr lang="en-US" smtClean="0"/>
-              <a:t>1/1/25</a:t>
+              <a:t>3/24/25</a:t>
             </a:fld>
             <a:endParaRPr lang="en-US"/>
           </a:p>
@@ -1821,7 +1821,7 @@
           <a:p>
             <a:fld id="{93E6349B-033D-F544-9B2B-DA796A3C1F03}" type="datetimeFigureOut">
               <a:rPr lang="en-US" smtClean="0"/>
-              <a:t>1/1/25</a:t>
+              <a:t>3/24/25</a:t>
             </a:fld>
             <a:endParaRPr lang="en-US"/>
           </a:p>
@@ -2098,7 +2098,7 @@
           <a:p>
             <a:fld id="{93E6349B-033D-F544-9B2B-DA796A3C1F03}" type="datetimeFigureOut">
               <a:rPr lang="en-US" smtClean="0"/>
-              <a:t>1/1/25</a:t>
+              <a:t>3/24/25</a:t>
             </a:fld>
             <a:endParaRPr lang="en-US"/>
           </a:p>
@@ -2355,7 +2355,7 @@
           <a:p>
             <a:fld id="{93E6349B-033D-F544-9B2B-DA796A3C1F03}" type="datetimeFigureOut">
               <a:rPr lang="en-US" smtClean="0"/>
-              <a:t>1/1/25</a:t>
+              <a:t>3/24/25</a:t>
             </a:fld>
             <a:endParaRPr lang="en-US"/>
           </a:p>
@@ -2568,7 +2568,7 @@
           <a:p>
             <a:fld id="{93E6349B-033D-F544-9B2B-DA796A3C1F03}" type="datetimeFigureOut">
               <a:rPr lang="en-US" smtClean="0"/>
-              <a:t>1/1/25</a:t>
+              <a:t>3/24/25</a:t>
             </a:fld>
             <a:endParaRPr lang="en-US"/>
           </a:p>
@@ -6735,6 +6735,36 @@
           <a:chExt cx="0" cy="0"/>
         </a:xfrm>
       </p:grpSpPr>
+      <p:pic>
+        <p:nvPicPr>
+          <p:cNvPr id="246" name="Picture 245" descr="A graph of linear graphs&#10;&#10;Description automatically generated with medium confidence">
+            <a:extLst>
+              <a:ext uri="{FF2B5EF4-FFF2-40B4-BE49-F238E27FC236}">
+                <a16:creationId xmlns:a16="http://schemas.microsoft.com/office/drawing/2014/main" id="{5635CF10-B6A3-5A2D-B661-C8D904CFD5BA}"/>
+              </a:ext>
+            </a:extLst>
+          </p:cNvPr>
+          <p:cNvPicPr>
+            <a:picLocks noChangeAspect="1"/>
+          </p:cNvPicPr>
+          <p:nvPr/>
+        </p:nvPicPr>
+        <p:blipFill>
+          <a:blip r:embed="rId2"/>
+          <a:stretch>
+            <a:fillRect/>
+          </a:stretch>
+        </p:blipFill>
+        <p:spPr>
+          <a:xfrm>
+            <a:off x="29446550" y="2235157"/>
+            <a:ext cx="12114950" cy="30287375"/>
+          </a:xfrm>
+          <a:prstGeom prst="rect">
+            <a:avLst/>
+          </a:prstGeom>
+        </p:spPr>
+      </p:pic>
       <p:sp>
         <p:nvSpPr>
           <p:cNvPr id="214" name="Sun">
@@ -7413,7 +7443,7 @@
           </a:ln>
           <a:extLst>
             <a:ext uri="{C572A759-6A51-4108-AA02-DFA0A04FC94B}">
-              <ma14:wrappingTextBoxFlag xmlns="" xmlns:m="http://schemas.openxmlformats.org/officeDocument/2006/math" xmlns:a14="http://schemas.microsoft.com/office/drawing/2010/main" xmlns:ma14="http://schemas.microsoft.com/office/mac/drawingml/2011/main" val="1"/>
+              <ma14:wrappingTextBoxFlag xmlns:ma14="http://schemas.microsoft.com/office/mac/drawingml/2011/main" xmlns:a14="http://schemas.microsoft.com/office/drawing/2010/main" xmlns:m="http://schemas.openxmlformats.org/officeDocument/2006/math" xmlns="" val="1"/>
             </a:ext>
           </a:extLst>
         </p:spPr>
@@ -7472,7 +7502,7 @@
           </a:ln>
           <a:extLst>
             <a:ext uri="{C572A759-6A51-4108-AA02-DFA0A04FC94B}">
-              <ma14:wrappingTextBoxFlag xmlns="" xmlns:m="http://schemas.openxmlformats.org/officeDocument/2006/math" xmlns:a14="http://schemas.microsoft.com/office/drawing/2010/main" xmlns:ma14="http://schemas.microsoft.com/office/mac/drawingml/2011/main" val="1"/>
+              <ma14:wrappingTextBoxFlag xmlns:ma14="http://schemas.microsoft.com/office/mac/drawingml/2011/main" xmlns:a14="http://schemas.microsoft.com/office/drawing/2010/main" xmlns:m="http://schemas.openxmlformats.org/officeDocument/2006/math" xmlns="" val="1"/>
             </a:ext>
           </a:extLst>
         </p:spPr>
@@ -7585,7 +7615,7 @@
           </a:ln>
           <a:extLst>
             <a:ext uri="{C572A759-6A51-4108-AA02-DFA0A04FC94B}">
-              <ma14:wrappingTextBoxFlag xmlns="" xmlns:m="http://schemas.openxmlformats.org/officeDocument/2006/math" xmlns:a14="http://schemas.microsoft.com/office/drawing/2010/main" xmlns:ma14="http://schemas.microsoft.com/office/mac/drawingml/2011/main" val="1"/>
+              <ma14:wrappingTextBoxFlag xmlns:ma14="http://schemas.microsoft.com/office/mac/drawingml/2011/main" xmlns:a14="http://schemas.microsoft.com/office/drawing/2010/main" xmlns:m="http://schemas.openxmlformats.org/officeDocument/2006/math" xmlns="" val="1"/>
             </a:ext>
           </a:extLst>
         </p:spPr>
@@ -9347,7 +9377,7 @@
           </a:ln>
           <a:extLst>
             <a:ext uri="{C572A759-6A51-4108-AA02-DFA0A04FC94B}">
-              <ma14:wrappingTextBoxFlag xmlns="" xmlns:m="http://schemas.openxmlformats.org/officeDocument/2006/math" xmlns:a14="http://schemas.microsoft.com/office/drawing/2010/main" xmlns:ma14="http://schemas.microsoft.com/office/mac/drawingml/2011/main" val="1"/>
+              <ma14:wrappingTextBoxFlag xmlns:ma14="http://schemas.microsoft.com/office/mac/drawingml/2011/main" xmlns:a14="http://schemas.microsoft.com/office/drawing/2010/main" xmlns:m="http://schemas.openxmlformats.org/officeDocument/2006/math" xmlns="" val="1"/>
             </a:ext>
           </a:extLst>
         </p:spPr>
@@ -9403,7 +9433,7 @@
           </a:ln>
           <a:extLst>
             <a:ext uri="{C572A759-6A51-4108-AA02-DFA0A04FC94B}">
-              <ma14:wrappingTextBoxFlag xmlns="" xmlns:m="http://schemas.openxmlformats.org/officeDocument/2006/math" xmlns:a14="http://schemas.microsoft.com/office/drawing/2010/main" xmlns:ma14="http://schemas.microsoft.com/office/mac/drawingml/2011/main" val="1"/>
+              <ma14:wrappingTextBoxFlag xmlns:ma14="http://schemas.microsoft.com/office/mac/drawingml/2011/main" xmlns:a14="http://schemas.microsoft.com/office/drawing/2010/main" xmlns:m="http://schemas.openxmlformats.org/officeDocument/2006/math" xmlns="" val="1"/>
             </a:ext>
           </a:extLst>
         </p:spPr>
@@ -9459,7 +9489,7 @@
           </a:ln>
           <a:extLst>
             <a:ext uri="{C572A759-6A51-4108-AA02-DFA0A04FC94B}">
-              <ma14:wrappingTextBoxFlag xmlns="" xmlns:m="http://schemas.openxmlformats.org/officeDocument/2006/math" xmlns:a14="http://schemas.microsoft.com/office/drawing/2010/main" xmlns:ma14="http://schemas.microsoft.com/office/mac/drawingml/2011/main" val="1"/>
+              <ma14:wrappingTextBoxFlag xmlns:ma14="http://schemas.microsoft.com/office/mac/drawingml/2011/main" xmlns:a14="http://schemas.microsoft.com/office/drawing/2010/main" xmlns:m="http://schemas.openxmlformats.org/officeDocument/2006/math" xmlns="" val="1"/>
             </a:ext>
           </a:extLst>
         </p:spPr>
@@ -9515,7 +9545,7 @@
           </a:ln>
           <a:extLst>
             <a:ext uri="{C572A759-6A51-4108-AA02-DFA0A04FC94B}">
-              <ma14:wrappingTextBoxFlag xmlns="" xmlns:m="http://schemas.openxmlformats.org/officeDocument/2006/math" xmlns:a14="http://schemas.microsoft.com/office/drawing/2010/main" xmlns:ma14="http://schemas.microsoft.com/office/mac/drawingml/2011/main" val="1"/>
+              <ma14:wrappingTextBoxFlag xmlns:ma14="http://schemas.microsoft.com/office/mac/drawingml/2011/main" xmlns:a14="http://schemas.microsoft.com/office/drawing/2010/main" xmlns:m="http://schemas.openxmlformats.org/officeDocument/2006/math" xmlns="" val="1"/>
             </a:ext>
           </a:extLst>
         </p:spPr>
@@ -13088,7 +13118,7 @@
           </a:ln>
           <a:extLst>
             <a:ext uri="{C572A759-6A51-4108-AA02-DFA0A04FC94B}">
-              <ma14:wrappingTextBoxFlag xmlns="" xmlns:m="http://schemas.openxmlformats.org/officeDocument/2006/math" xmlns:a14="http://schemas.microsoft.com/office/drawing/2010/main" xmlns:ma14="http://schemas.microsoft.com/office/mac/drawingml/2011/main" val="1"/>
+              <ma14:wrappingTextBoxFlag xmlns:ma14="http://schemas.microsoft.com/office/mac/drawingml/2011/main" xmlns:a14="http://schemas.microsoft.com/office/drawing/2010/main" xmlns:m="http://schemas.openxmlformats.org/officeDocument/2006/math" xmlns="" val="1"/>
             </a:ext>
           </a:extLst>
         </p:spPr>
@@ -13153,7 +13183,7 @@
           </a:ln>
           <a:extLst>
             <a:ext uri="{C572A759-6A51-4108-AA02-DFA0A04FC94B}">
-              <ma14:wrappingTextBoxFlag xmlns="" xmlns:m="http://schemas.openxmlformats.org/officeDocument/2006/math" xmlns:a14="http://schemas.microsoft.com/office/drawing/2010/main" xmlns:ma14="http://schemas.microsoft.com/office/mac/drawingml/2011/main" val="1"/>
+              <ma14:wrappingTextBoxFlag xmlns:ma14="http://schemas.microsoft.com/office/mac/drawingml/2011/main" xmlns:a14="http://schemas.microsoft.com/office/drawing/2010/main" xmlns:m="http://schemas.openxmlformats.org/officeDocument/2006/math" xmlns="" val="1"/>
             </a:ext>
           </a:extLst>
         </p:spPr>
@@ -13212,7 +13242,7 @@
           </a:ln>
           <a:extLst>
             <a:ext uri="{C572A759-6A51-4108-AA02-DFA0A04FC94B}">
-              <ma14:wrappingTextBoxFlag xmlns="" xmlns:m="http://schemas.openxmlformats.org/officeDocument/2006/math" xmlns:a14="http://schemas.microsoft.com/office/drawing/2010/main" xmlns:ma14="http://schemas.microsoft.com/office/mac/drawingml/2011/main" val="1"/>
+              <ma14:wrappingTextBoxFlag xmlns:ma14="http://schemas.microsoft.com/office/mac/drawingml/2011/main" xmlns:a14="http://schemas.microsoft.com/office/drawing/2010/main" xmlns:m="http://schemas.openxmlformats.org/officeDocument/2006/math" xmlns="" val="1"/>
             </a:ext>
           </a:extLst>
         </p:spPr>
@@ -13325,7 +13355,7 @@
           </a:ln>
           <a:extLst>
             <a:ext uri="{C572A759-6A51-4108-AA02-DFA0A04FC94B}">
-              <ma14:wrappingTextBoxFlag xmlns="" xmlns:m="http://schemas.openxmlformats.org/officeDocument/2006/math" xmlns:a14="http://schemas.microsoft.com/office/drawing/2010/main" xmlns:ma14="http://schemas.microsoft.com/office/mac/drawingml/2011/main" val="1"/>
+              <ma14:wrappingTextBoxFlag xmlns:ma14="http://schemas.microsoft.com/office/mac/drawingml/2011/main" xmlns:a14="http://schemas.microsoft.com/office/drawing/2010/main" xmlns:m="http://schemas.openxmlformats.org/officeDocument/2006/math" xmlns="" val="1"/>
             </a:ext>
           </a:extLst>
         </p:spPr>
@@ -15904,7 +15934,7 @@
           </a:ln>
           <a:extLst>
             <a:ext uri="{C572A759-6A51-4108-AA02-DFA0A04FC94B}">
-              <ma14:wrappingTextBoxFlag xmlns="" xmlns:m="http://schemas.openxmlformats.org/officeDocument/2006/math" xmlns:a14="http://schemas.microsoft.com/office/drawing/2010/main" xmlns:ma14="http://schemas.microsoft.com/office/mac/drawingml/2011/main" val="1"/>
+              <ma14:wrappingTextBoxFlag xmlns:ma14="http://schemas.microsoft.com/office/mac/drawingml/2011/main" xmlns:a14="http://schemas.microsoft.com/office/drawing/2010/main" xmlns:m="http://schemas.openxmlformats.org/officeDocument/2006/math" xmlns="" val="1"/>
             </a:ext>
           </a:extLst>
         </p:spPr>
@@ -15963,7 +15993,7 @@
           </a:ln>
           <a:extLst>
             <a:ext uri="{C572A759-6A51-4108-AA02-DFA0A04FC94B}">
-              <ma14:wrappingTextBoxFlag xmlns="" xmlns:m="http://schemas.openxmlformats.org/officeDocument/2006/math" xmlns:a14="http://schemas.microsoft.com/office/drawing/2010/main" xmlns:ma14="http://schemas.microsoft.com/office/mac/drawingml/2011/main" val="1"/>
+              <ma14:wrappingTextBoxFlag xmlns:ma14="http://schemas.microsoft.com/office/mac/drawingml/2011/main" xmlns:a14="http://schemas.microsoft.com/office/drawing/2010/main" xmlns:m="http://schemas.openxmlformats.org/officeDocument/2006/math" xmlns="" val="1"/>
             </a:ext>
           </a:extLst>
         </p:spPr>
@@ -18203,7 +18233,7 @@
           </a:ln>
           <a:extLst>
             <a:ext uri="{C572A759-6A51-4108-AA02-DFA0A04FC94B}">
-              <ma14:wrappingTextBoxFlag xmlns="" xmlns:m="http://schemas.openxmlformats.org/officeDocument/2006/math" xmlns:a14="http://schemas.microsoft.com/office/drawing/2010/main" xmlns:ma14="http://schemas.microsoft.com/office/mac/drawingml/2011/main" val="1"/>
+              <ma14:wrappingTextBoxFlag xmlns:ma14="http://schemas.microsoft.com/office/mac/drawingml/2011/main" xmlns:a14="http://schemas.microsoft.com/office/drawing/2010/main" xmlns:m="http://schemas.openxmlformats.org/officeDocument/2006/math" xmlns="" val="1"/>
             </a:ext>
           </a:extLst>
         </p:spPr>
@@ -18311,7 +18341,7 @@
           </a:ln>
           <a:extLst>
             <a:ext uri="{C572A759-6A51-4108-AA02-DFA0A04FC94B}">
-              <ma14:wrappingTextBoxFlag xmlns="" xmlns:m="http://schemas.openxmlformats.org/officeDocument/2006/math" xmlns:a14="http://schemas.microsoft.com/office/drawing/2010/main" xmlns:ma14="http://schemas.microsoft.com/office/mac/drawingml/2011/main" val="1"/>
+              <ma14:wrappingTextBoxFlag xmlns:ma14="http://schemas.microsoft.com/office/mac/drawingml/2011/main" xmlns:a14="http://schemas.microsoft.com/office/drawing/2010/main" xmlns:m="http://schemas.openxmlformats.org/officeDocument/2006/math" xmlns="" val="1"/>
             </a:ext>
           </a:extLst>
         </p:spPr>
@@ -20278,10 +20308,10 @@
           <p:nvPr/>
         </p:nvPicPr>
         <p:blipFill>
-          <a:blip r:embed="rId2">
+          <a:blip r:embed="rId3">
             <a:extLst>
               <a:ext uri="{96DAC541-7B7A-43D3-8B79-37D633B846F1}">
-                <asvg:svgBlip xmlns:asvg="http://schemas.microsoft.com/office/drawing/2016/SVG/main" r:embed="rId3"/>
+                <asvg:svgBlip xmlns:asvg="http://schemas.microsoft.com/office/drawing/2016/SVG/main" r:embed="rId4"/>
               </a:ext>
             </a:extLst>
           </a:blip>
@@ -21436,7 +21466,7 @@
           </a:ln>
           <a:extLst>
             <a:ext uri="{C572A759-6A51-4108-AA02-DFA0A04FC94B}">
-              <ma14:wrappingTextBoxFlag xmlns="" xmlns:m="http://schemas.openxmlformats.org/officeDocument/2006/math" xmlns:a14="http://schemas.microsoft.com/office/drawing/2010/main" xmlns:ma14="http://schemas.microsoft.com/office/mac/drawingml/2011/main" val="1"/>
+              <ma14:wrappingTextBoxFlag xmlns:ma14="http://schemas.microsoft.com/office/mac/drawingml/2011/main" xmlns:a14="http://schemas.microsoft.com/office/drawing/2010/main" xmlns:m="http://schemas.openxmlformats.org/officeDocument/2006/math" xmlns="" val="1"/>
             </a:ext>
           </a:extLst>
         </p:spPr>
@@ -23698,7 +23728,7 @@
           </a:ln>
           <a:extLst>
             <a:ext uri="{C572A759-6A51-4108-AA02-DFA0A04FC94B}">
-              <ma14:wrappingTextBoxFlag xmlns="" xmlns:m="http://schemas.openxmlformats.org/officeDocument/2006/math" xmlns:a14="http://schemas.microsoft.com/office/drawing/2010/main" xmlns:ma14="http://schemas.microsoft.com/office/mac/drawingml/2011/main" val="1"/>
+              <ma14:wrappingTextBoxFlag xmlns:ma14="http://schemas.microsoft.com/office/mac/drawingml/2011/main" xmlns:a14="http://schemas.microsoft.com/office/drawing/2010/main" xmlns:m="http://schemas.openxmlformats.org/officeDocument/2006/math" xmlns="" val="1"/>
             </a:ext>
           </a:extLst>
         </p:spPr>
@@ -24078,7 +24108,7 @@
           </a:ln>
           <a:extLst>
             <a:ext uri="{C572A759-6A51-4108-AA02-DFA0A04FC94B}">
-              <ma14:wrappingTextBoxFlag xmlns="" xmlns:m="http://schemas.openxmlformats.org/officeDocument/2006/math" xmlns:a14="http://schemas.microsoft.com/office/drawing/2010/main" xmlns:ma14="http://schemas.microsoft.com/office/mac/drawingml/2011/main" val="1"/>
+              <ma14:wrappingTextBoxFlag xmlns:ma14="http://schemas.microsoft.com/office/mac/drawingml/2011/main" xmlns:a14="http://schemas.microsoft.com/office/drawing/2010/main" xmlns:m="http://schemas.openxmlformats.org/officeDocument/2006/math" xmlns="" val="1"/>
             </a:ext>
           </a:extLst>
         </p:spPr>
@@ -24342,7 +24372,7 @@
           </a:ln>
           <a:extLst>
             <a:ext uri="{C572A759-6A51-4108-AA02-DFA0A04FC94B}">
-              <ma14:wrappingTextBoxFlag xmlns="" xmlns:m="http://schemas.openxmlformats.org/officeDocument/2006/math" xmlns:a14="http://schemas.microsoft.com/office/drawing/2010/main" xmlns:ma14="http://schemas.microsoft.com/office/mac/drawingml/2011/main" val="1"/>
+              <ma14:wrappingTextBoxFlag xmlns:ma14="http://schemas.microsoft.com/office/mac/drawingml/2011/main" xmlns:a14="http://schemas.microsoft.com/office/drawing/2010/main" xmlns:m="http://schemas.openxmlformats.org/officeDocument/2006/math" xmlns="" val="1"/>
             </a:ext>
           </a:extLst>
         </p:spPr>
@@ -24933,7 +24963,7 @@
           </a:ln>
           <a:extLst>
             <a:ext uri="{C572A759-6A51-4108-AA02-DFA0A04FC94B}">
-              <ma14:wrappingTextBoxFlag xmlns="" xmlns:m="http://schemas.openxmlformats.org/officeDocument/2006/math" xmlns:a14="http://schemas.microsoft.com/office/drawing/2010/main" xmlns:ma14="http://schemas.microsoft.com/office/mac/drawingml/2011/main" val="1"/>
+              <ma14:wrappingTextBoxFlag xmlns:ma14="http://schemas.microsoft.com/office/mac/drawingml/2011/main" xmlns:a14="http://schemas.microsoft.com/office/drawing/2010/main" xmlns:m="http://schemas.openxmlformats.org/officeDocument/2006/math" xmlns="" val="1"/>
             </a:ext>
           </a:extLst>
         </p:spPr>
@@ -30017,7 +30047,7 @@
           </a:ln>
           <a:extLst>
             <a:ext uri="{C572A759-6A51-4108-AA02-DFA0A04FC94B}">
-              <ma14:wrappingTextBoxFlag xmlns="" xmlns:m="http://schemas.openxmlformats.org/officeDocument/2006/math" xmlns:a14="http://schemas.microsoft.com/office/drawing/2010/main" xmlns:ma14="http://schemas.microsoft.com/office/mac/drawingml/2011/main" val="1"/>
+              <ma14:wrappingTextBoxFlag xmlns:ma14="http://schemas.microsoft.com/office/mac/drawingml/2011/main" xmlns:a14="http://schemas.microsoft.com/office/drawing/2010/main" xmlns:m="http://schemas.openxmlformats.org/officeDocument/2006/math" xmlns="" val="1"/>
             </a:ext>
           </a:extLst>
         </p:spPr>
@@ -38851,8 +38881,8 @@
         </p:nvSpPr>
         <p:spPr>
           <a:xfrm>
-            <a:off x="22667613" y="22301439"/>
-            <a:ext cx="3229154" cy="2123658"/>
+            <a:off x="22728462" y="22559847"/>
+            <a:ext cx="3229154" cy="1446550"/>
           </a:xfrm>
           <a:prstGeom prst="rect">
             <a:avLst/>
@@ -38866,162 +38896,17 @@
           <a:lstStyle/>
           <a:p>
             <a:r>
-              <a:rPr lang="en-US" sz="4400" i="1" dirty="0">
-                <a:highlight>
-                  <a:srgbClr val="FFFF00"/>
-                </a:highlight>
-              </a:rPr>
+              <a:rPr lang="en-US" sz="4400" i="1" dirty="0"/>
               <a:t>(</a:t>
             </a:r>
             <a:r>
-              <a:rPr lang="en-US" sz="4400" i="1" dirty="0" err="1">
-                <a:highlight>
-                  <a:srgbClr val="FFFF00"/>
-                </a:highlight>
-              </a:rPr>
+              <a:rPr lang="en-US" sz="4400" i="1" dirty="0" err="1"/>
               <a:t>FaIR</a:t>
             </a:r>
             <a:r>
-              <a:rPr lang="en-US" sz="4400" i="1" dirty="0">
-                <a:highlight>
-                  <a:srgbClr val="FFFF00"/>
-                </a:highlight>
-              </a:rPr>
-              <a:t> used within this – how??)</a:t>
+              <a:rPr lang="en-US" sz="4400" i="1" dirty="0"/>
+              <a:t> used within this)</a:t>
             </a:r>
-          </a:p>
-        </p:txBody>
-      </p:sp>
-      <p:pic>
-        <p:nvPicPr>
-          <p:cNvPr id="81" name="Picture 80" descr="A white board with writing on it&#10;&#10;Description automatically generated">
-            <a:extLst>
-              <a:ext uri="{FF2B5EF4-FFF2-40B4-BE49-F238E27FC236}">
-                <a16:creationId xmlns:a16="http://schemas.microsoft.com/office/drawing/2014/main" id="{98CC8540-500B-A085-1B66-EFAC805052D0}"/>
-              </a:ext>
-            </a:extLst>
-          </p:cNvPr>
-          <p:cNvPicPr>
-            <a:picLocks noChangeAspect="1"/>
-          </p:cNvPicPr>
-          <p:nvPr/>
-        </p:nvPicPr>
-        <p:blipFill>
-          <a:blip r:embed="rId4"/>
-          <a:srcRect l="1143" t="24028" r="9539" b="21729"/>
-          <a:stretch/>
-        </p:blipFill>
-        <p:spPr>
-          <a:xfrm rot="5400000">
-            <a:off x="22219278" y="11562058"/>
-            <a:ext cx="27403706" cy="12481558"/>
-          </a:xfrm>
-          <a:prstGeom prst="rect">
-            <a:avLst/>
-          </a:prstGeom>
-        </p:spPr>
-      </p:pic>
-      <p:sp>
-        <p:nvSpPr>
-          <p:cNvPr id="105" name="Rectangle 104">
-            <a:extLst>
-              <a:ext uri="{FF2B5EF4-FFF2-40B4-BE49-F238E27FC236}">
-                <a16:creationId xmlns:a16="http://schemas.microsoft.com/office/drawing/2014/main" id="{B86EF86F-4572-62F8-7B74-BACD840C11F4}"/>
-              </a:ext>
-            </a:extLst>
-          </p:cNvPr>
-          <p:cNvSpPr/>
-          <p:nvPr/>
-        </p:nvSpPr>
-        <p:spPr>
-          <a:xfrm>
-            <a:off x="32461199" y="20281112"/>
-            <a:ext cx="4903028" cy="1846145"/>
-          </a:xfrm>
-          <a:prstGeom prst="rect">
-            <a:avLst/>
-          </a:prstGeom>
-          <a:solidFill>
-            <a:srgbClr val="AAABA6"/>
-          </a:solidFill>
-          <a:ln>
-            <a:noFill/>
-          </a:ln>
-        </p:spPr>
-        <p:style>
-          <a:lnRef idx="2">
-            <a:schemeClr val="accent1">
-              <a:shade val="15000"/>
-            </a:schemeClr>
-          </a:lnRef>
-          <a:fillRef idx="1">
-            <a:schemeClr val="accent1"/>
-          </a:fillRef>
-          <a:effectRef idx="0">
-            <a:schemeClr val="accent1"/>
-          </a:effectRef>
-          <a:fontRef idx="minor">
-            <a:schemeClr val="lt1"/>
-          </a:fontRef>
-        </p:style>
-        <p:txBody>
-          <a:bodyPr rtlCol="0" anchor="ctr"/>
-          <a:lstStyle/>
-          <a:p>
-            <a:pPr algn="ctr"/>
-            <a:endParaRPr lang="en-US"/>
-          </a:p>
-        </p:txBody>
-      </p:sp>
-      <p:sp>
-        <p:nvSpPr>
-          <p:cNvPr id="110" name="Rectangle 109">
-            <a:extLst>
-              <a:ext uri="{FF2B5EF4-FFF2-40B4-BE49-F238E27FC236}">
-                <a16:creationId xmlns:a16="http://schemas.microsoft.com/office/drawing/2014/main" id="{9751C40A-99AC-EFDE-CE12-94CE37DF9E40}"/>
-              </a:ext>
-            </a:extLst>
-          </p:cNvPr>
-          <p:cNvSpPr/>
-          <p:nvPr/>
-        </p:nvSpPr>
-        <p:spPr>
-          <a:xfrm>
-            <a:off x="37673874" y="24090233"/>
-            <a:ext cx="3974124" cy="3023151"/>
-          </a:xfrm>
-          <a:prstGeom prst="rect">
-            <a:avLst/>
-          </a:prstGeom>
-          <a:solidFill>
-            <a:srgbClr val="9B9C97"/>
-          </a:solidFill>
-          <a:ln>
-            <a:noFill/>
-          </a:ln>
-        </p:spPr>
-        <p:style>
-          <a:lnRef idx="2">
-            <a:schemeClr val="accent1">
-              <a:shade val="15000"/>
-            </a:schemeClr>
-          </a:lnRef>
-          <a:fillRef idx="1">
-            <a:schemeClr val="accent1"/>
-          </a:fillRef>
-          <a:effectRef idx="0">
-            <a:schemeClr val="accent1"/>
-          </a:effectRef>
-          <a:fontRef idx="minor">
-            <a:schemeClr val="lt1"/>
-          </a:fontRef>
-        </p:style>
-        <p:txBody>
-          <a:bodyPr rtlCol="0" anchor="ctr"/>
-          <a:lstStyle/>
-          <a:p>
-            <a:pPr algn="ctr"/>
-            <a:endParaRPr lang="en-US"/>
           </a:p>
         </p:txBody>
       </p:sp>
@@ -39039,8 +38924,8 @@
         </p:nvSpPr>
         <p:spPr>
           <a:xfrm>
-            <a:off x="35676615" y="26266617"/>
-            <a:ext cx="5189229" cy="1518939"/>
+            <a:off x="37969083" y="29533238"/>
+            <a:ext cx="5793205" cy="2169735"/>
           </a:xfrm>
           <a:custGeom>
             <a:avLst/>
@@ -39155,7 +39040,10 @@
             </a:pathLst>
           </a:custGeom>
           <a:solidFill>
-            <a:srgbClr val="00B0F0"/>
+            <a:schemeClr val="accent2">
+              <a:lumMod val="60000"/>
+              <a:lumOff val="40000"/>
+            </a:schemeClr>
           </a:solidFill>
         </p:spPr>
         <p:style>
@@ -39197,8 +39085,8 @@
         </p:nvSpPr>
         <p:spPr>
           <a:xfrm>
-            <a:off x="38472418" y="25886706"/>
-            <a:ext cx="2312761" cy="1898850"/>
+            <a:off x="40764886" y="28990553"/>
+            <a:ext cx="2581944" cy="2712420"/>
           </a:xfrm>
           <a:custGeom>
             <a:avLst/>
@@ -39358,8 +39246,8 @@
         </p:nvSpPr>
         <p:spPr>
           <a:xfrm>
-            <a:off x="38510861" y="25360655"/>
-            <a:ext cx="1313391" cy="2413311"/>
+            <a:off x="40803329" y="28244080"/>
+            <a:ext cx="1466257" cy="3447304"/>
           </a:xfrm>
           <a:custGeom>
             <a:avLst/>
@@ -39474,7 +39362,7 @@
             </a:pathLst>
           </a:custGeom>
           <a:solidFill>
-            <a:srgbClr val="C00000">
+            <a:srgbClr val="945200">
               <a:alpha val="39694"/>
             </a:srgbClr>
           </a:solidFill>
@@ -39520,8 +39408,8 @@
         </p:nvCxnSpPr>
         <p:spPr>
           <a:xfrm flipV="1">
-            <a:off x="22931052" y="8628982"/>
-            <a:ext cx="6423832" cy="1260233"/>
+            <a:off x="22592054" y="8019327"/>
+            <a:ext cx="7579792" cy="2003313"/>
           </a:xfrm>
           <a:prstGeom prst="line">
             <a:avLst/>
@@ -39549,36 +39437,6 @@
           </a:fontRef>
         </p:style>
       </p:cxnSp>
-      <p:pic>
-        <p:nvPicPr>
-          <p:cNvPr id="104" name="Picture 103" descr="A black letter on a white background&#10;&#10;Description automatically generated">
-            <a:extLst>
-              <a:ext uri="{FF2B5EF4-FFF2-40B4-BE49-F238E27FC236}">
-                <a16:creationId xmlns:a16="http://schemas.microsoft.com/office/drawing/2014/main" id="{BA9B9F72-9927-37D3-E7B6-3B2C7EDB6F24}"/>
-              </a:ext>
-            </a:extLst>
-          </p:cNvPr>
-          <p:cNvPicPr>
-            <a:picLocks noChangeAspect="1"/>
-          </p:cNvPicPr>
-          <p:nvPr/>
-        </p:nvPicPr>
-        <p:blipFill>
-          <a:blip r:embed="rId5"/>
-          <a:stretch>
-            <a:fillRect/>
-          </a:stretch>
-        </p:blipFill>
-        <p:spPr>
-          <a:xfrm>
-            <a:off x="32824866" y="18409811"/>
-            <a:ext cx="9078722" cy="2234162"/>
-          </a:xfrm>
-          <a:prstGeom prst="rect">
-            <a:avLst/>
-          </a:prstGeom>
-        </p:spPr>
-      </p:pic>
       <p:sp>
         <p:nvSpPr>
           <p:cNvPr id="244" name="TextBox 243">
@@ -39710,8 +39568,8 @@
         </p:nvCxnSpPr>
         <p:spPr>
           <a:xfrm flipV="1">
-            <a:off x="22562679" y="14148476"/>
-            <a:ext cx="7797166" cy="1597193"/>
+            <a:off x="22562679" y="13610569"/>
+            <a:ext cx="7321165" cy="2135100"/>
           </a:xfrm>
           <a:prstGeom prst="line">
             <a:avLst/>
@@ -39959,10 +39817,10 @@
           <p:nvPr/>
         </p:nvPicPr>
         <p:blipFill>
-          <a:blip r:embed="rId6">
+          <a:blip r:embed="rId5">
             <a:extLst>
               <a:ext uri="{96DAC541-7B7A-43D3-8B79-37D633B846F1}">
-                <asvg:svgBlip xmlns:asvg="http://schemas.microsoft.com/office/drawing/2016/SVG/main" r:embed="rId7"/>
+                <asvg:svgBlip xmlns:asvg="http://schemas.microsoft.com/office/drawing/2016/SVG/main" r:embed="rId6"/>
               </a:ext>
             </a:extLst>
           </a:blip>
@@ -39971,7 +39829,7 @@
         </p:blipFill>
         <p:spPr>
           <a:xfrm rot="2399908">
-            <a:off x="35619584" y="10566656"/>
+            <a:off x="39513392" y="12033128"/>
             <a:ext cx="4371733" cy="4581890"/>
           </a:xfrm>
           <a:prstGeom prst="rect">
@@ -39979,58 +39837,6 @@
           </a:prstGeom>
         </p:spPr>
       </p:pic>
-      <p:sp>
-        <p:nvSpPr>
-          <p:cNvPr id="304" name="Rectangle 303">
-            <a:extLst>
-              <a:ext uri="{FF2B5EF4-FFF2-40B4-BE49-F238E27FC236}">
-                <a16:creationId xmlns:a16="http://schemas.microsoft.com/office/drawing/2014/main" id="{CB935254-798F-A183-1BB2-812374AED7A4}"/>
-              </a:ext>
-            </a:extLst>
-          </p:cNvPr>
-          <p:cNvSpPr/>
-          <p:nvPr/>
-        </p:nvSpPr>
-        <p:spPr>
-          <a:xfrm>
-            <a:off x="34963051" y="5763939"/>
-            <a:ext cx="3974124" cy="3023151"/>
-          </a:xfrm>
-          <a:prstGeom prst="rect">
-            <a:avLst/>
-          </a:prstGeom>
-          <a:solidFill>
-            <a:srgbClr val="BBBBB9"/>
-          </a:solidFill>
-          <a:ln>
-            <a:noFill/>
-          </a:ln>
-        </p:spPr>
-        <p:style>
-          <a:lnRef idx="2">
-            <a:schemeClr val="accent1">
-              <a:shade val="15000"/>
-            </a:schemeClr>
-          </a:lnRef>
-          <a:fillRef idx="1">
-            <a:schemeClr val="accent1"/>
-          </a:fillRef>
-          <a:effectRef idx="0">
-            <a:schemeClr val="accent1"/>
-          </a:effectRef>
-          <a:fontRef idx="minor">
-            <a:schemeClr val="lt1"/>
-          </a:fontRef>
-        </p:style>
-        <p:txBody>
-          <a:bodyPr rtlCol="0" anchor="ctr"/>
-          <a:lstStyle/>
-          <a:p>
-            <a:pPr algn="ctr"/>
-            <a:endParaRPr lang="en-US"/>
-          </a:p>
-        </p:txBody>
-      </p:sp>
       <p:sp>
         <p:nvSpPr>
           <p:cNvPr id="281" name="Freeform 280">
@@ -40045,7 +39851,7 @@
         </p:nvSpPr>
         <p:spPr>
           <a:xfrm>
-            <a:off x="35990676" y="4634802"/>
+            <a:off x="38363947" y="5672153"/>
             <a:ext cx="2248007" cy="658014"/>
           </a:xfrm>
           <a:custGeom>
@@ -40205,7 +40011,7 @@
         </p:nvCxnSpPr>
         <p:spPr>
           <a:xfrm>
-            <a:off x="35933837" y="5292816"/>
+            <a:off x="38307108" y="6330167"/>
             <a:ext cx="2608118" cy="0"/>
           </a:xfrm>
           <a:prstGeom prst="straightConnector1">
@@ -40255,7 +40061,7 @@
         </p:nvSpPr>
         <p:spPr>
           <a:xfrm>
-            <a:off x="39430100" y="5751029"/>
+            <a:off x="41803371" y="6788380"/>
             <a:ext cx="2248007" cy="658014"/>
           </a:xfrm>
           <a:custGeom>
@@ -40415,7 +40221,7 @@
         </p:nvCxnSpPr>
         <p:spPr>
           <a:xfrm>
-            <a:off x="39373261" y="6409043"/>
+            <a:off x="41746532" y="7446394"/>
             <a:ext cx="2608118" cy="0"/>
           </a:xfrm>
           <a:prstGeom prst="straightConnector1">
@@ -40465,7 +40271,7 @@
         </p:nvSpPr>
         <p:spPr>
           <a:xfrm>
-            <a:off x="40595539" y="5586449"/>
+            <a:off x="42968810" y="6623800"/>
             <a:ext cx="1001903" cy="822594"/>
           </a:xfrm>
           <a:custGeom>
@@ -40626,7 +40432,7 @@
         </p:nvSpPr>
         <p:spPr>
           <a:xfrm>
-            <a:off x="37002786" y="7189308"/>
+            <a:off x="39376057" y="8226659"/>
             <a:ext cx="1037968" cy="1126572"/>
           </a:xfrm>
           <a:custGeom>
@@ -40786,7 +40592,7 @@
         </p:nvCxnSpPr>
         <p:spPr>
           <a:xfrm>
-            <a:off x="36032712" y="8315879"/>
+            <a:off x="38405983" y="9353230"/>
             <a:ext cx="2608118" cy="0"/>
           </a:xfrm>
           <a:prstGeom prst="straightConnector1">
@@ -40836,7 +40642,7 @@
         </p:nvSpPr>
         <p:spPr>
           <a:xfrm rot="18900000">
-            <a:off x="35195303" y="5527790"/>
+            <a:off x="37568574" y="6565141"/>
             <a:ext cx="1468473" cy="1864451"/>
           </a:xfrm>
           <a:prstGeom prst="bentArrow">
@@ -40894,7 +40700,7 @@
         </p:nvSpPr>
         <p:spPr>
           <a:xfrm rot="10800000">
-            <a:off x="38365365" y="6552098"/>
+            <a:off x="40738636" y="7589449"/>
             <a:ext cx="1719588" cy="1318740"/>
           </a:xfrm>
           <a:prstGeom prst="bentArrow">
@@ -40952,7 +40758,7 @@
         </p:nvSpPr>
         <p:spPr>
           <a:xfrm rot="5079891">
-            <a:off x="38909768" y="4615798"/>
+            <a:off x="41283039" y="5653149"/>
             <a:ext cx="1014114" cy="1380381"/>
           </a:xfrm>
           <a:prstGeom prst="bentArrow">
@@ -41010,7 +40816,7 @@
         </p:nvCxnSpPr>
         <p:spPr>
           <a:xfrm>
-            <a:off x="37107907" y="5161729"/>
+            <a:off x="39481178" y="6199080"/>
             <a:ext cx="0" cy="474272"/>
           </a:xfrm>
           <a:prstGeom prst="line">
@@ -41048,13 +40854,13 @@
           <p:nvPr/>
         </p:nvPicPr>
         <p:blipFill>
-          <a:blip r:embed="rId8"/>
+          <a:blip r:embed="rId7"/>
           <a:srcRect t="21492" r="90123" b="70834"/>
           <a:stretch/>
         </p:blipFill>
         <p:spPr>
           <a:xfrm>
-            <a:off x="36627659" y="5729241"/>
+            <a:off x="39000930" y="6766592"/>
             <a:ext cx="924042" cy="420842"/>
           </a:xfrm>
           <a:prstGeom prst="rect">
@@ -41078,7 +40884,7 @@
         </p:nvCxnSpPr>
         <p:spPr>
           <a:xfrm>
-            <a:off x="41118195" y="6460015"/>
+            <a:off x="43491466" y="7497366"/>
             <a:ext cx="0" cy="474272"/>
           </a:xfrm>
           <a:prstGeom prst="line">
@@ -41117,7 +40923,7 @@
         </p:nvCxnSpPr>
         <p:spPr>
           <a:xfrm>
-            <a:off x="40554103" y="6553327"/>
+            <a:off x="42927374" y="7590678"/>
             <a:ext cx="542387" cy="0"/>
           </a:xfrm>
           <a:prstGeom prst="line">
@@ -41155,13 +40961,13 @@
           <p:nvPr/>
         </p:nvPicPr>
         <p:blipFill>
-          <a:blip r:embed="rId8"/>
+          <a:blip r:embed="rId7"/>
           <a:srcRect l="5433" t="45351" r="90325" b="49055"/>
           <a:stretch/>
         </p:blipFill>
         <p:spPr>
           <a:xfrm>
-            <a:off x="40576725" y="6588293"/>
+            <a:off x="42949996" y="7625644"/>
             <a:ext cx="396834" cy="306820"/>
           </a:xfrm>
           <a:prstGeom prst="rect">
@@ -41184,13 +40990,13 @@
           <p:nvPr/>
         </p:nvPicPr>
         <p:blipFill>
-          <a:blip r:embed="rId8"/>
+          <a:blip r:embed="rId7"/>
           <a:srcRect l="12109" t="45555" r="84799" b="48289"/>
           <a:stretch/>
         </p:blipFill>
         <p:spPr>
           <a:xfrm>
-            <a:off x="40944100" y="6930078"/>
+            <a:off x="43317371" y="7967429"/>
             <a:ext cx="289271" cy="337570"/>
           </a:xfrm>
           <a:prstGeom prst="rect">
@@ -41214,7 +41020,7 @@
         </p:nvCxnSpPr>
         <p:spPr>
           <a:xfrm>
-            <a:off x="37523260" y="8268028"/>
+            <a:off x="39896531" y="9305379"/>
             <a:ext cx="0" cy="474272"/>
           </a:xfrm>
           <a:prstGeom prst="line">
@@ -41252,13 +41058,13 @@
           <p:nvPr/>
         </p:nvPicPr>
         <p:blipFill>
-          <a:blip r:embed="rId8"/>
+          <a:blip r:embed="rId7"/>
           <a:srcRect l="4322" t="78590" r="90545" b="14568"/>
           <a:stretch/>
         </p:blipFill>
         <p:spPr>
           <a:xfrm>
-            <a:off x="37237896" y="8797680"/>
+            <a:off x="39611167" y="9835031"/>
             <a:ext cx="480244" cy="375218"/>
           </a:xfrm>
           <a:prstGeom prst="rect">
@@ -41266,293 +41072,35 @@
           </a:prstGeom>
         </p:spPr>
       </p:pic>
-      <p:cxnSp>
-        <p:nvCxnSpPr>
-          <p:cNvPr id="312" name="Straight Connector 311">
+      <p:pic>
+        <p:nvPicPr>
+          <p:cNvPr id="87" name="Picture 86" descr="A black text with a white background&#10;&#10;Description automatically generated">
             <a:extLst>
               <a:ext uri="{FF2B5EF4-FFF2-40B4-BE49-F238E27FC236}">
-                <a16:creationId xmlns:a16="http://schemas.microsoft.com/office/drawing/2014/main" id="{D5C7984A-13FF-030A-8858-860E617CD700}"/>
+                <a16:creationId xmlns:a16="http://schemas.microsoft.com/office/drawing/2014/main" id="{1659BFD5-DBA9-87CB-4B06-F77470729F50}"/>
               </a:ext>
             </a:extLst>
           </p:cNvPr>
-          <p:cNvCxnSpPr>
-            <a:cxnSpLocks/>
-          </p:cNvCxnSpPr>
+          <p:cNvPicPr>
+            <a:picLocks noChangeAspect="1"/>
+          </p:cNvPicPr>
           <p:nvPr/>
-        </p:nvCxnSpPr>
+        </p:nvPicPr>
+        <p:blipFill>
+          <a:blip r:embed="rId8"/>
+          <a:srcRect t="15644" b="16040"/>
+          <a:stretch/>
+        </p:blipFill>
         <p:spPr>
-          <a:xfrm flipV="1">
-            <a:off x="31868247" y="20672640"/>
-            <a:ext cx="4344669" cy="3277412"/>
+          <a:xfrm>
+            <a:off x="33728201" y="22713364"/>
+            <a:ext cx="10923532" cy="1671835"/>
           </a:xfrm>
-          <a:prstGeom prst="line">
+          <a:prstGeom prst="rect">
             <a:avLst/>
           </a:prstGeom>
-          <a:ln w="63500">
-            <a:solidFill>
-              <a:schemeClr val="tx1"/>
-            </a:solidFill>
-          </a:ln>
         </p:spPr>
-        <p:style>
-          <a:lnRef idx="1">
-            <a:schemeClr val="dk1"/>
-          </a:lnRef>
-          <a:fillRef idx="0">
-            <a:schemeClr val="dk1"/>
-          </a:fillRef>
-          <a:effectRef idx="0">
-            <a:schemeClr val="dk1"/>
-          </a:effectRef>
-          <a:fontRef idx="minor">
-            <a:schemeClr val="tx1"/>
-          </a:fontRef>
-        </p:style>
-      </p:cxnSp>
-      <p:cxnSp>
-        <p:nvCxnSpPr>
-          <p:cNvPr id="314" name="Straight Connector 313">
-            <a:extLst>
-              <a:ext uri="{FF2B5EF4-FFF2-40B4-BE49-F238E27FC236}">
-                <a16:creationId xmlns:a16="http://schemas.microsoft.com/office/drawing/2014/main" id="{38BEC364-C8F8-8126-ECB1-D3F2AEFE6FCC}"/>
-              </a:ext>
-            </a:extLst>
-          </p:cNvPr>
-          <p:cNvCxnSpPr>
-            <a:cxnSpLocks/>
-          </p:cNvCxnSpPr>
-          <p:nvPr/>
-        </p:nvCxnSpPr>
-        <p:spPr>
-          <a:xfrm flipV="1">
-            <a:off x="32475413" y="24967218"/>
-            <a:ext cx="1905136" cy="4619763"/>
-          </a:xfrm>
-          <a:prstGeom prst="line">
-            <a:avLst/>
-          </a:prstGeom>
-          <a:ln w="190500">
-            <a:solidFill>
-              <a:schemeClr val="accent1">
-                <a:lumMod val="50000"/>
-              </a:schemeClr>
-            </a:solidFill>
-          </a:ln>
-        </p:spPr>
-        <p:style>
-          <a:lnRef idx="1">
-            <a:schemeClr val="dk1"/>
-          </a:lnRef>
-          <a:fillRef idx="0">
-            <a:schemeClr val="dk1"/>
-          </a:fillRef>
-          <a:effectRef idx="0">
-            <a:schemeClr val="dk1"/>
-          </a:effectRef>
-          <a:fontRef idx="minor">
-            <a:schemeClr val="tx1"/>
-          </a:fontRef>
-        </p:style>
-      </p:cxnSp>
-      <p:cxnSp>
-        <p:nvCxnSpPr>
-          <p:cNvPr id="316" name="Straight Connector 315">
-            <a:extLst>
-              <a:ext uri="{FF2B5EF4-FFF2-40B4-BE49-F238E27FC236}">
-                <a16:creationId xmlns:a16="http://schemas.microsoft.com/office/drawing/2014/main" id="{3BC5E61D-6D9E-9246-E1D5-A358E325C094}"/>
-              </a:ext>
-            </a:extLst>
-          </p:cNvPr>
-          <p:cNvCxnSpPr>
-            <a:cxnSpLocks/>
-          </p:cNvCxnSpPr>
-          <p:nvPr/>
-        </p:nvCxnSpPr>
-        <p:spPr>
-          <a:xfrm flipV="1">
-            <a:off x="33083460" y="25601808"/>
-            <a:ext cx="2741490" cy="4136972"/>
-          </a:xfrm>
-          <a:prstGeom prst="line">
-            <a:avLst/>
-          </a:prstGeom>
-          <a:ln w="190500">
-            <a:solidFill>
-              <a:srgbClr val="C00000"/>
-            </a:solidFill>
-          </a:ln>
-        </p:spPr>
-        <p:style>
-          <a:lnRef idx="1">
-            <a:schemeClr val="dk1"/>
-          </a:lnRef>
-          <a:fillRef idx="0">
-            <a:schemeClr val="dk1"/>
-          </a:fillRef>
-          <a:effectRef idx="0">
-            <a:schemeClr val="dk1"/>
-          </a:effectRef>
-          <a:fontRef idx="minor">
-            <a:schemeClr val="tx1"/>
-          </a:fontRef>
-        </p:style>
-      </p:cxnSp>
-      <p:sp>
-        <p:nvSpPr>
-          <p:cNvPr id="318" name="Oval 317">
-            <a:extLst>
-              <a:ext uri="{FF2B5EF4-FFF2-40B4-BE49-F238E27FC236}">
-                <a16:creationId xmlns:a16="http://schemas.microsoft.com/office/drawing/2014/main" id="{5A2E0CEB-5173-0E09-91AB-0C7D5F6F2FC8}"/>
-              </a:ext>
-            </a:extLst>
-          </p:cNvPr>
-          <p:cNvSpPr/>
-          <p:nvPr/>
-        </p:nvSpPr>
-        <p:spPr>
-          <a:xfrm flipH="1">
-            <a:off x="35366837" y="22070430"/>
-            <a:ext cx="50924" cy="225299"/>
-          </a:xfrm>
-          <a:prstGeom prst="ellipse">
-            <a:avLst/>
-          </a:prstGeom>
-          <a:solidFill>
-            <a:schemeClr val="tx1"/>
-          </a:solidFill>
-          <a:ln>
-            <a:noFill/>
-          </a:ln>
-        </p:spPr>
-        <p:style>
-          <a:lnRef idx="2">
-            <a:schemeClr val="accent1">
-              <a:shade val="15000"/>
-            </a:schemeClr>
-          </a:lnRef>
-          <a:fillRef idx="1">
-            <a:schemeClr val="accent1"/>
-          </a:fillRef>
-          <a:effectRef idx="0">
-            <a:schemeClr val="accent1"/>
-          </a:effectRef>
-          <a:fontRef idx="minor">
-            <a:schemeClr val="lt1"/>
-          </a:fontRef>
-        </p:style>
-        <p:txBody>
-          <a:bodyPr rtlCol="0" anchor="ctr"/>
-          <a:lstStyle/>
-          <a:p>
-            <a:pPr algn="ctr"/>
-            <a:endParaRPr lang="en-US"/>
-          </a:p>
-        </p:txBody>
-      </p:sp>
-      <p:sp>
-        <p:nvSpPr>
-          <p:cNvPr id="319" name="Oval 318">
-            <a:extLst>
-              <a:ext uri="{FF2B5EF4-FFF2-40B4-BE49-F238E27FC236}">
-                <a16:creationId xmlns:a16="http://schemas.microsoft.com/office/drawing/2014/main" id="{F96BD556-ADE6-8B3F-DB63-B7A457525A73}"/>
-              </a:ext>
-            </a:extLst>
-          </p:cNvPr>
-          <p:cNvSpPr/>
-          <p:nvPr/>
-        </p:nvSpPr>
-        <p:spPr>
-          <a:xfrm flipH="1">
-            <a:off x="33890453" y="21551314"/>
-            <a:ext cx="50924" cy="225299"/>
-          </a:xfrm>
-          <a:prstGeom prst="ellipse">
-            <a:avLst/>
-          </a:prstGeom>
-          <a:solidFill>
-            <a:schemeClr val="tx1"/>
-          </a:solidFill>
-          <a:ln>
-            <a:noFill/>
-          </a:ln>
-        </p:spPr>
-        <p:style>
-          <a:lnRef idx="2">
-            <a:schemeClr val="accent1">
-              <a:shade val="15000"/>
-            </a:schemeClr>
-          </a:lnRef>
-          <a:fillRef idx="1">
-            <a:schemeClr val="accent1"/>
-          </a:fillRef>
-          <a:effectRef idx="0">
-            <a:schemeClr val="accent1"/>
-          </a:effectRef>
-          <a:fontRef idx="minor">
-            <a:schemeClr val="lt1"/>
-          </a:fontRef>
-        </p:style>
-        <p:txBody>
-          <a:bodyPr rtlCol="0" anchor="ctr"/>
-          <a:lstStyle/>
-          <a:p>
-            <a:pPr algn="ctr"/>
-            <a:endParaRPr lang="en-US"/>
-          </a:p>
-        </p:txBody>
-      </p:sp>
-      <p:sp>
-        <p:nvSpPr>
-          <p:cNvPr id="320" name="Oval 319">
-            <a:extLst>
-              <a:ext uri="{FF2B5EF4-FFF2-40B4-BE49-F238E27FC236}">
-                <a16:creationId xmlns:a16="http://schemas.microsoft.com/office/drawing/2014/main" id="{DF88C248-1B04-9000-49F0-C1248A745FB0}"/>
-              </a:ext>
-            </a:extLst>
-          </p:cNvPr>
-          <p:cNvSpPr/>
-          <p:nvPr/>
-        </p:nvSpPr>
-        <p:spPr>
-          <a:xfrm flipH="1">
-            <a:off x="34821527" y="20903610"/>
-            <a:ext cx="50924" cy="225299"/>
-          </a:xfrm>
-          <a:prstGeom prst="ellipse">
-            <a:avLst/>
-          </a:prstGeom>
-          <a:solidFill>
-            <a:schemeClr val="tx1"/>
-          </a:solidFill>
-          <a:ln>
-            <a:noFill/>
-          </a:ln>
-        </p:spPr>
-        <p:style>
-          <a:lnRef idx="2">
-            <a:schemeClr val="accent1">
-              <a:shade val="15000"/>
-            </a:schemeClr>
-          </a:lnRef>
-          <a:fillRef idx="1">
-            <a:schemeClr val="accent1"/>
-          </a:fillRef>
-          <a:effectRef idx="0">
-            <a:schemeClr val="accent1"/>
-          </a:effectRef>
-          <a:fontRef idx="minor">
-            <a:schemeClr val="lt1"/>
-          </a:fontRef>
-        </p:style>
-        <p:txBody>
-          <a:bodyPr rtlCol="0" anchor="ctr"/>
-          <a:lstStyle/>
-          <a:p>
-            <a:pPr algn="ctr"/>
-            <a:endParaRPr lang="en-US"/>
-          </a:p>
-        </p:txBody>
-      </p:sp>
+      </p:pic>
     </p:spTree>
     <p:extLst>
       <p:ext uri="{BB962C8B-B14F-4D97-AF65-F5344CB8AC3E}">

</xml_diff>

<commit_message>
histens fixes, pushing to run LOO code
</commit_message>
<xml_diff>
--- a/Illustrative_Figures/Combination_43_v3a.pptx
+++ b/Illustrative_Figures/Combination_43_v3a.pptx
@@ -245,7 +245,7 @@
           <a:p>
             <a:fld id="{93E6349B-033D-F544-9B2B-DA796A3C1F03}" type="datetimeFigureOut">
               <a:rPr lang="en-US" smtClean="0"/>
-              <a:t>3/24/25</a:t>
+              <a:t>11/20/25</a:t>
             </a:fld>
             <a:endParaRPr lang="en-US"/>
           </a:p>
@@ -415,7 +415,7 @@
           <a:p>
             <a:fld id="{93E6349B-033D-F544-9B2B-DA796A3C1F03}" type="datetimeFigureOut">
               <a:rPr lang="en-US" smtClean="0"/>
-              <a:t>3/24/25</a:t>
+              <a:t>11/20/25</a:t>
             </a:fld>
             <a:endParaRPr lang="en-US"/>
           </a:p>
@@ -595,7 +595,7 @@
           <a:p>
             <a:fld id="{93E6349B-033D-F544-9B2B-DA796A3C1F03}" type="datetimeFigureOut">
               <a:rPr lang="en-US" smtClean="0"/>
-              <a:t>3/24/25</a:t>
+              <a:t>11/20/25</a:t>
             </a:fld>
             <a:endParaRPr lang="en-US"/>
           </a:p>
@@ -765,7 +765,7 @@
           <a:p>
             <a:fld id="{93E6349B-033D-F544-9B2B-DA796A3C1F03}" type="datetimeFigureOut">
               <a:rPr lang="en-US" smtClean="0"/>
-              <a:t>3/24/25</a:t>
+              <a:t>11/20/25</a:t>
             </a:fld>
             <a:endParaRPr lang="en-US"/>
           </a:p>
@@ -1009,7 +1009,7 @@
           <a:p>
             <a:fld id="{93E6349B-033D-F544-9B2B-DA796A3C1F03}" type="datetimeFigureOut">
               <a:rPr lang="en-US" smtClean="0"/>
-              <a:t>3/24/25</a:t>
+              <a:t>11/20/25</a:t>
             </a:fld>
             <a:endParaRPr lang="en-US"/>
           </a:p>
@@ -1241,7 +1241,7 @@
           <a:p>
             <a:fld id="{93E6349B-033D-F544-9B2B-DA796A3C1F03}" type="datetimeFigureOut">
               <a:rPr lang="en-US" smtClean="0"/>
-              <a:t>3/24/25</a:t>
+              <a:t>11/20/25</a:t>
             </a:fld>
             <a:endParaRPr lang="en-US"/>
           </a:p>
@@ -1608,7 +1608,7 @@
           <a:p>
             <a:fld id="{93E6349B-033D-F544-9B2B-DA796A3C1F03}" type="datetimeFigureOut">
               <a:rPr lang="en-US" smtClean="0"/>
-              <a:t>3/24/25</a:t>
+              <a:t>11/20/25</a:t>
             </a:fld>
             <a:endParaRPr lang="en-US"/>
           </a:p>
@@ -1726,7 +1726,7 @@
           <a:p>
             <a:fld id="{93E6349B-033D-F544-9B2B-DA796A3C1F03}" type="datetimeFigureOut">
               <a:rPr lang="en-US" smtClean="0"/>
-              <a:t>3/24/25</a:t>
+              <a:t>11/20/25</a:t>
             </a:fld>
             <a:endParaRPr lang="en-US"/>
           </a:p>
@@ -1821,7 +1821,7 @@
           <a:p>
             <a:fld id="{93E6349B-033D-F544-9B2B-DA796A3C1F03}" type="datetimeFigureOut">
               <a:rPr lang="en-US" smtClean="0"/>
-              <a:t>3/24/25</a:t>
+              <a:t>11/20/25</a:t>
             </a:fld>
             <a:endParaRPr lang="en-US"/>
           </a:p>
@@ -2098,7 +2098,7 @@
           <a:p>
             <a:fld id="{93E6349B-033D-F544-9B2B-DA796A3C1F03}" type="datetimeFigureOut">
               <a:rPr lang="en-US" smtClean="0"/>
-              <a:t>3/24/25</a:t>
+              <a:t>11/20/25</a:t>
             </a:fld>
             <a:endParaRPr lang="en-US"/>
           </a:p>
@@ -2355,7 +2355,7 @@
           <a:p>
             <a:fld id="{93E6349B-033D-F544-9B2B-DA796A3C1F03}" type="datetimeFigureOut">
               <a:rPr lang="en-US" smtClean="0"/>
-              <a:t>3/24/25</a:t>
+              <a:t>11/20/25</a:t>
             </a:fld>
             <a:endParaRPr lang="en-US"/>
           </a:p>
@@ -2568,7 +2568,7 @@
           <a:p>
             <a:fld id="{93E6349B-033D-F544-9B2B-DA796A3C1F03}" type="datetimeFigureOut">
               <a:rPr lang="en-US" smtClean="0"/>
-              <a:t>3/24/25</a:t>
+              <a:t>11/20/25</a:t>
             </a:fld>
             <a:endParaRPr lang="en-US"/>
           </a:p>
@@ -7443,7 +7443,7 @@
           </a:ln>
           <a:extLst>
             <a:ext uri="{C572A759-6A51-4108-AA02-DFA0A04FC94B}">
-              <ma14:wrappingTextBoxFlag xmlns:ma14="http://schemas.microsoft.com/office/mac/drawingml/2011/main" xmlns:a14="http://schemas.microsoft.com/office/drawing/2010/main" xmlns:m="http://schemas.openxmlformats.org/officeDocument/2006/math" xmlns="" val="1"/>
+              <ma14:wrappingTextBoxFlag xmlns="" xmlns:m="http://schemas.openxmlformats.org/officeDocument/2006/math" xmlns:a14="http://schemas.microsoft.com/office/drawing/2010/main" xmlns:ma14="http://schemas.microsoft.com/office/mac/drawingml/2011/main" val="1"/>
             </a:ext>
           </a:extLst>
         </p:spPr>
@@ -7502,7 +7502,7 @@
           </a:ln>
           <a:extLst>
             <a:ext uri="{C572A759-6A51-4108-AA02-DFA0A04FC94B}">
-              <ma14:wrappingTextBoxFlag xmlns:ma14="http://schemas.microsoft.com/office/mac/drawingml/2011/main" xmlns:a14="http://schemas.microsoft.com/office/drawing/2010/main" xmlns:m="http://schemas.openxmlformats.org/officeDocument/2006/math" xmlns="" val="1"/>
+              <ma14:wrappingTextBoxFlag xmlns="" xmlns:m="http://schemas.openxmlformats.org/officeDocument/2006/math" xmlns:a14="http://schemas.microsoft.com/office/drawing/2010/main" xmlns:ma14="http://schemas.microsoft.com/office/mac/drawingml/2011/main" val="1"/>
             </a:ext>
           </a:extLst>
         </p:spPr>
@@ -7615,7 +7615,7 @@
           </a:ln>
           <a:extLst>
             <a:ext uri="{C572A759-6A51-4108-AA02-DFA0A04FC94B}">
-              <ma14:wrappingTextBoxFlag xmlns:ma14="http://schemas.microsoft.com/office/mac/drawingml/2011/main" xmlns:a14="http://schemas.microsoft.com/office/drawing/2010/main" xmlns:m="http://schemas.openxmlformats.org/officeDocument/2006/math" xmlns="" val="1"/>
+              <ma14:wrappingTextBoxFlag xmlns="" xmlns:m="http://schemas.openxmlformats.org/officeDocument/2006/math" xmlns:a14="http://schemas.microsoft.com/office/drawing/2010/main" xmlns:ma14="http://schemas.microsoft.com/office/mac/drawingml/2011/main" val="1"/>
             </a:ext>
           </a:extLst>
         </p:spPr>
@@ -9377,7 +9377,7 @@
           </a:ln>
           <a:extLst>
             <a:ext uri="{C572A759-6A51-4108-AA02-DFA0A04FC94B}">
-              <ma14:wrappingTextBoxFlag xmlns:ma14="http://schemas.microsoft.com/office/mac/drawingml/2011/main" xmlns:a14="http://schemas.microsoft.com/office/drawing/2010/main" xmlns:m="http://schemas.openxmlformats.org/officeDocument/2006/math" xmlns="" val="1"/>
+              <ma14:wrappingTextBoxFlag xmlns="" xmlns:m="http://schemas.openxmlformats.org/officeDocument/2006/math" xmlns:a14="http://schemas.microsoft.com/office/drawing/2010/main" xmlns:ma14="http://schemas.microsoft.com/office/mac/drawingml/2011/main" val="1"/>
             </a:ext>
           </a:extLst>
         </p:spPr>
@@ -9433,7 +9433,7 @@
           </a:ln>
           <a:extLst>
             <a:ext uri="{C572A759-6A51-4108-AA02-DFA0A04FC94B}">
-              <ma14:wrappingTextBoxFlag xmlns:ma14="http://schemas.microsoft.com/office/mac/drawingml/2011/main" xmlns:a14="http://schemas.microsoft.com/office/drawing/2010/main" xmlns:m="http://schemas.openxmlformats.org/officeDocument/2006/math" xmlns="" val="1"/>
+              <ma14:wrappingTextBoxFlag xmlns="" xmlns:m="http://schemas.openxmlformats.org/officeDocument/2006/math" xmlns:a14="http://schemas.microsoft.com/office/drawing/2010/main" xmlns:ma14="http://schemas.microsoft.com/office/mac/drawingml/2011/main" val="1"/>
             </a:ext>
           </a:extLst>
         </p:spPr>
@@ -9489,7 +9489,7 @@
           </a:ln>
           <a:extLst>
             <a:ext uri="{C572A759-6A51-4108-AA02-DFA0A04FC94B}">
-              <ma14:wrappingTextBoxFlag xmlns:ma14="http://schemas.microsoft.com/office/mac/drawingml/2011/main" xmlns:a14="http://schemas.microsoft.com/office/drawing/2010/main" xmlns:m="http://schemas.openxmlformats.org/officeDocument/2006/math" xmlns="" val="1"/>
+              <ma14:wrappingTextBoxFlag xmlns="" xmlns:m="http://schemas.openxmlformats.org/officeDocument/2006/math" xmlns:a14="http://schemas.microsoft.com/office/drawing/2010/main" xmlns:ma14="http://schemas.microsoft.com/office/mac/drawingml/2011/main" val="1"/>
             </a:ext>
           </a:extLst>
         </p:spPr>
@@ -9545,7 +9545,7 @@
           </a:ln>
           <a:extLst>
             <a:ext uri="{C572A759-6A51-4108-AA02-DFA0A04FC94B}">
-              <ma14:wrappingTextBoxFlag xmlns:ma14="http://schemas.microsoft.com/office/mac/drawingml/2011/main" xmlns:a14="http://schemas.microsoft.com/office/drawing/2010/main" xmlns:m="http://schemas.openxmlformats.org/officeDocument/2006/math" xmlns="" val="1"/>
+              <ma14:wrappingTextBoxFlag xmlns="" xmlns:m="http://schemas.openxmlformats.org/officeDocument/2006/math" xmlns:a14="http://schemas.microsoft.com/office/drawing/2010/main" xmlns:ma14="http://schemas.microsoft.com/office/mac/drawingml/2011/main" val="1"/>
             </a:ext>
           </a:extLst>
         </p:spPr>
@@ -13118,7 +13118,7 @@
           </a:ln>
           <a:extLst>
             <a:ext uri="{C572A759-6A51-4108-AA02-DFA0A04FC94B}">
-              <ma14:wrappingTextBoxFlag xmlns:ma14="http://schemas.microsoft.com/office/mac/drawingml/2011/main" xmlns:a14="http://schemas.microsoft.com/office/drawing/2010/main" xmlns:m="http://schemas.openxmlformats.org/officeDocument/2006/math" xmlns="" val="1"/>
+              <ma14:wrappingTextBoxFlag xmlns="" xmlns:m="http://schemas.openxmlformats.org/officeDocument/2006/math" xmlns:a14="http://schemas.microsoft.com/office/drawing/2010/main" xmlns:ma14="http://schemas.microsoft.com/office/mac/drawingml/2011/main" val="1"/>
             </a:ext>
           </a:extLst>
         </p:spPr>
@@ -13183,7 +13183,7 @@
           </a:ln>
           <a:extLst>
             <a:ext uri="{C572A759-6A51-4108-AA02-DFA0A04FC94B}">
-              <ma14:wrappingTextBoxFlag xmlns:ma14="http://schemas.microsoft.com/office/mac/drawingml/2011/main" xmlns:a14="http://schemas.microsoft.com/office/drawing/2010/main" xmlns:m="http://schemas.openxmlformats.org/officeDocument/2006/math" xmlns="" val="1"/>
+              <ma14:wrappingTextBoxFlag xmlns="" xmlns:m="http://schemas.openxmlformats.org/officeDocument/2006/math" xmlns:a14="http://schemas.microsoft.com/office/drawing/2010/main" xmlns:ma14="http://schemas.microsoft.com/office/mac/drawingml/2011/main" val="1"/>
             </a:ext>
           </a:extLst>
         </p:spPr>
@@ -13242,7 +13242,7 @@
           </a:ln>
           <a:extLst>
             <a:ext uri="{C572A759-6A51-4108-AA02-DFA0A04FC94B}">
-              <ma14:wrappingTextBoxFlag xmlns:ma14="http://schemas.microsoft.com/office/mac/drawingml/2011/main" xmlns:a14="http://schemas.microsoft.com/office/drawing/2010/main" xmlns:m="http://schemas.openxmlformats.org/officeDocument/2006/math" xmlns="" val="1"/>
+              <ma14:wrappingTextBoxFlag xmlns="" xmlns:m="http://schemas.openxmlformats.org/officeDocument/2006/math" xmlns:a14="http://schemas.microsoft.com/office/drawing/2010/main" xmlns:ma14="http://schemas.microsoft.com/office/mac/drawingml/2011/main" val="1"/>
             </a:ext>
           </a:extLst>
         </p:spPr>
@@ -13355,7 +13355,7 @@
           </a:ln>
           <a:extLst>
             <a:ext uri="{C572A759-6A51-4108-AA02-DFA0A04FC94B}">
-              <ma14:wrappingTextBoxFlag xmlns:ma14="http://schemas.microsoft.com/office/mac/drawingml/2011/main" xmlns:a14="http://schemas.microsoft.com/office/drawing/2010/main" xmlns:m="http://schemas.openxmlformats.org/officeDocument/2006/math" xmlns="" val="1"/>
+              <ma14:wrappingTextBoxFlag xmlns="" xmlns:m="http://schemas.openxmlformats.org/officeDocument/2006/math" xmlns:a14="http://schemas.microsoft.com/office/drawing/2010/main" xmlns:ma14="http://schemas.microsoft.com/office/mac/drawingml/2011/main" val="1"/>
             </a:ext>
           </a:extLst>
         </p:spPr>
@@ -15934,7 +15934,7 @@
           </a:ln>
           <a:extLst>
             <a:ext uri="{C572A759-6A51-4108-AA02-DFA0A04FC94B}">
-              <ma14:wrappingTextBoxFlag xmlns:ma14="http://schemas.microsoft.com/office/mac/drawingml/2011/main" xmlns:a14="http://schemas.microsoft.com/office/drawing/2010/main" xmlns:m="http://schemas.openxmlformats.org/officeDocument/2006/math" xmlns="" val="1"/>
+              <ma14:wrappingTextBoxFlag xmlns="" xmlns:m="http://schemas.openxmlformats.org/officeDocument/2006/math" xmlns:a14="http://schemas.microsoft.com/office/drawing/2010/main" xmlns:ma14="http://schemas.microsoft.com/office/mac/drawingml/2011/main" val="1"/>
             </a:ext>
           </a:extLst>
         </p:spPr>
@@ -15993,7 +15993,7 @@
           </a:ln>
           <a:extLst>
             <a:ext uri="{C572A759-6A51-4108-AA02-DFA0A04FC94B}">
-              <ma14:wrappingTextBoxFlag xmlns:ma14="http://schemas.microsoft.com/office/mac/drawingml/2011/main" xmlns:a14="http://schemas.microsoft.com/office/drawing/2010/main" xmlns:m="http://schemas.openxmlformats.org/officeDocument/2006/math" xmlns="" val="1"/>
+              <ma14:wrappingTextBoxFlag xmlns="" xmlns:m="http://schemas.openxmlformats.org/officeDocument/2006/math" xmlns:a14="http://schemas.microsoft.com/office/drawing/2010/main" xmlns:ma14="http://schemas.microsoft.com/office/mac/drawingml/2011/main" val="1"/>
             </a:ext>
           </a:extLst>
         </p:spPr>
@@ -18233,7 +18233,7 @@
           </a:ln>
           <a:extLst>
             <a:ext uri="{C572A759-6A51-4108-AA02-DFA0A04FC94B}">
-              <ma14:wrappingTextBoxFlag xmlns:ma14="http://schemas.microsoft.com/office/mac/drawingml/2011/main" xmlns:a14="http://schemas.microsoft.com/office/drawing/2010/main" xmlns:m="http://schemas.openxmlformats.org/officeDocument/2006/math" xmlns="" val="1"/>
+              <ma14:wrappingTextBoxFlag xmlns="" xmlns:m="http://schemas.openxmlformats.org/officeDocument/2006/math" xmlns:a14="http://schemas.microsoft.com/office/drawing/2010/main" xmlns:ma14="http://schemas.microsoft.com/office/mac/drawingml/2011/main" val="1"/>
             </a:ext>
           </a:extLst>
         </p:spPr>
@@ -18341,7 +18341,7 @@
           </a:ln>
           <a:extLst>
             <a:ext uri="{C572A759-6A51-4108-AA02-DFA0A04FC94B}">
-              <ma14:wrappingTextBoxFlag xmlns:ma14="http://schemas.microsoft.com/office/mac/drawingml/2011/main" xmlns:a14="http://schemas.microsoft.com/office/drawing/2010/main" xmlns:m="http://schemas.openxmlformats.org/officeDocument/2006/math" xmlns="" val="1"/>
+              <ma14:wrappingTextBoxFlag xmlns="" xmlns:m="http://schemas.openxmlformats.org/officeDocument/2006/math" xmlns:a14="http://schemas.microsoft.com/office/drawing/2010/main" xmlns:ma14="http://schemas.microsoft.com/office/mac/drawingml/2011/main" val="1"/>
             </a:ext>
           </a:extLst>
         </p:spPr>
@@ -21466,7 +21466,7 @@
           </a:ln>
           <a:extLst>
             <a:ext uri="{C572A759-6A51-4108-AA02-DFA0A04FC94B}">
-              <ma14:wrappingTextBoxFlag xmlns:ma14="http://schemas.microsoft.com/office/mac/drawingml/2011/main" xmlns:a14="http://schemas.microsoft.com/office/drawing/2010/main" xmlns:m="http://schemas.openxmlformats.org/officeDocument/2006/math" xmlns="" val="1"/>
+              <ma14:wrappingTextBoxFlag xmlns="" xmlns:m="http://schemas.openxmlformats.org/officeDocument/2006/math" xmlns:a14="http://schemas.microsoft.com/office/drawing/2010/main" xmlns:ma14="http://schemas.microsoft.com/office/mac/drawingml/2011/main" val="1"/>
             </a:ext>
           </a:extLst>
         </p:spPr>
@@ -23728,7 +23728,7 @@
           </a:ln>
           <a:extLst>
             <a:ext uri="{C572A759-6A51-4108-AA02-DFA0A04FC94B}">
-              <ma14:wrappingTextBoxFlag xmlns:ma14="http://schemas.microsoft.com/office/mac/drawingml/2011/main" xmlns:a14="http://schemas.microsoft.com/office/drawing/2010/main" xmlns:m="http://schemas.openxmlformats.org/officeDocument/2006/math" xmlns="" val="1"/>
+              <ma14:wrappingTextBoxFlag xmlns="" xmlns:m="http://schemas.openxmlformats.org/officeDocument/2006/math" xmlns:a14="http://schemas.microsoft.com/office/drawing/2010/main" xmlns:ma14="http://schemas.microsoft.com/office/mac/drawingml/2011/main" val="1"/>
             </a:ext>
           </a:extLst>
         </p:spPr>
@@ -24108,7 +24108,7 @@
           </a:ln>
           <a:extLst>
             <a:ext uri="{C572A759-6A51-4108-AA02-DFA0A04FC94B}">
-              <ma14:wrappingTextBoxFlag xmlns:ma14="http://schemas.microsoft.com/office/mac/drawingml/2011/main" xmlns:a14="http://schemas.microsoft.com/office/drawing/2010/main" xmlns:m="http://schemas.openxmlformats.org/officeDocument/2006/math" xmlns="" val="1"/>
+              <ma14:wrappingTextBoxFlag xmlns="" xmlns:m="http://schemas.openxmlformats.org/officeDocument/2006/math" xmlns:a14="http://schemas.microsoft.com/office/drawing/2010/main" xmlns:ma14="http://schemas.microsoft.com/office/mac/drawingml/2011/main" val="1"/>
             </a:ext>
           </a:extLst>
         </p:spPr>
@@ -24372,7 +24372,7 @@
           </a:ln>
           <a:extLst>
             <a:ext uri="{C572A759-6A51-4108-AA02-DFA0A04FC94B}">
-              <ma14:wrappingTextBoxFlag xmlns:ma14="http://schemas.microsoft.com/office/mac/drawingml/2011/main" xmlns:a14="http://schemas.microsoft.com/office/drawing/2010/main" xmlns:m="http://schemas.openxmlformats.org/officeDocument/2006/math" xmlns="" val="1"/>
+              <ma14:wrappingTextBoxFlag xmlns="" xmlns:m="http://schemas.openxmlformats.org/officeDocument/2006/math" xmlns:a14="http://schemas.microsoft.com/office/drawing/2010/main" xmlns:ma14="http://schemas.microsoft.com/office/mac/drawingml/2011/main" val="1"/>
             </a:ext>
           </a:extLst>
         </p:spPr>
@@ -24709,7 +24709,7 @@
         </p:nvSpPr>
         <p:spPr>
           <a:xfrm rot="16200000">
-            <a:off x="15668787" y="17448414"/>
+            <a:off x="15668787" y="17702414"/>
             <a:ext cx="1248473" cy="6267212"/>
           </a:xfrm>
           <a:prstGeom prst="rightBrace">
@@ -24764,7 +24764,7 @@
         </p:nvSpPr>
         <p:spPr>
           <a:xfrm rot="16200000">
-            <a:off x="19692374" y="18064432"/>
+            <a:off x="19692374" y="18318432"/>
             <a:ext cx="1248473" cy="4751136"/>
           </a:xfrm>
           <a:prstGeom prst="rightBrace">
@@ -24819,7 +24819,7 @@
         </p:nvSpPr>
         <p:spPr>
           <a:xfrm>
-            <a:off x="14709168" y="19384369"/>
+            <a:off x="14709168" y="19638369"/>
             <a:ext cx="1673856" cy="646331"/>
           </a:xfrm>
           <a:prstGeom prst="rect">
@@ -24863,7 +24863,7 @@
         </p:nvSpPr>
         <p:spPr>
           <a:xfrm>
-            <a:off x="19624377" y="19275450"/>
+            <a:off x="19624377" y="19529450"/>
             <a:ext cx="3212418" cy="646331"/>
           </a:xfrm>
           <a:prstGeom prst="rect">
@@ -24963,7 +24963,7 @@
           </a:ln>
           <a:extLst>
             <a:ext uri="{C572A759-6A51-4108-AA02-DFA0A04FC94B}">
-              <ma14:wrappingTextBoxFlag xmlns:ma14="http://schemas.microsoft.com/office/mac/drawingml/2011/main" xmlns:a14="http://schemas.microsoft.com/office/drawing/2010/main" xmlns:m="http://schemas.openxmlformats.org/officeDocument/2006/math" xmlns="" val="1"/>
+              <ma14:wrappingTextBoxFlag xmlns="" xmlns:m="http://schemas.openxmlformats.org/officeDocument/2006/math" xmlns:a14="http://schemas.microsoft.com/office/drawing/2010/main" xmlns:ma14="http://schemas.microsoft.com/office/mac/drawingml/2011/main" val="1"/>
             </a:ext>
           </a:extLst>
         </p:spPr>
@@ -30047,7 +30047,7 @@
           </a:ln>
           <a:extLst>
             <a:ext uri="{C572A759-6A51-4108-AA02-DFA0A04FC94B}">
-              <ma14:wrappingTextBoxFlag xmlns:ma14="http://schemas.microsoft.com/office/mac/drawingml/2011/main" xmlns:a14="http://schemas.microsoft.com/office/drawing/2010/main" xmlns:m="http://schemas.openxmlformats.org/officeDocument/2006/math" xmlns="" val="1"/>
+              <ma14:wrappingTextBoxFlag xmlns="" xmlns:m="http://schemas.openxmlformats.org/officeDocument/2006/math" xmlns:a14="http://schemas.microsoft.com/office/drawing/2010/main" xmlns:ma14="http://schemas.microsoft.com/office/mac/drawingml/2011/main" val="1"/>
             </a:ext>
           </a:extLst>
         </p:spPr>
@@ -38869,49 +38869,6 @@
       </p:sp>
       <p:sp>
         <p:nvSpPr>
-          <p:cNvPr id="2" name="TextBox 1">
-            <a:extLst>
-              <a:ext uri="{FF2B5EF4-FFF2-40B4-BE49-F238E27FC236}">
-                <a16:creationId xmlns:a16="http://schemas.microsoft.com/office/drawing/2014/main" id="{B779B2B3-AF8D-5285-4B47-DDAB637037A0}"/>
-              </a:ext>
-            </a:extLst>
-          </p:cNvPr>
-          <p:cNvSpPr txBox="1"/>
-          <p:nvPr/>
-        </p:nvSpPr>
-        <p:spPr>
-          <a:xfrm>
-            <a:off x="22728462" y="22559847"/>
-            <a:ext cx="3229154" cy="1446550"/>
-          </a:xfrm>
-          <a:prstGeom prst="rect">
-            <a:avLst/>
-          </a:prstGeom>
-          <a:noFill/>
-        </p:spPr>
-        <p:txBody>
-          <a:bodyPr wrap="square" rtlCol="0">
-            <a:spAutoFit/>
-          </a:bodyPr>
-          <a:lstStyle/>
-          <a:p>
-            <a:r>
-              <a:rPr lang="en-US" sz="4400" i="1" dirty="0"/>
-              <a:t>(</a:t>
-            </a:r>
-            <a:r>
-              <a:rPr lang="en-US" sz="4400" i="1" dirty="0" err="1"/>
-              <a:t>FaIR</a:t>
-            </a:r>
-            <a:r>
-              <a:rPr lang="en-US" sz="4400" i="1" dirty="0"/>
-              <a:t> used within this)</a:t>
-            </a:r>
-          </a:p>
-        </p:txBody>
-      </p:sp>
-      <p:sp>
-        <p:nvSpPr>
           <p:cNvPr id="117" name="Freeform 116">
             <a:extLst>
               <a:ext uri="{FF2B5EF4-FFF2-40B4-BE49-F238E27FC236}">
@@ -39613,8 +39570,8 @@
         </p:nvCxnSpPr>
         <p:spPr>
           <a:xfrm flipV="1">
-            <a:off x="22523926" y="22331109"/>
-            <a:ext cx="7621089" cy="2771970"/>
+            <a:off x="22648712" y="22483509"/>
+            <a:ext cx="7496303" cy="2003313"/>
           </a:xfrm>
           <a:prstGeom prst="line">
             <a:avLst/>
@@ -41101,6 +41058,495 @@
           </a:prstGeom>
         </p:spPr>
       </p:pic>
+      <p:sp>
+        <p:nvSpPr>
+          <p:cNvPr id="3" name="Right Brace 2">
+            <a:extLst>
+              <a:ext uri="{FF2B5EF4-FFF2-40B4-BE49-F238E27FC236}">
+                <a16:creationId xmlns:a16="http://schemas.microsoft.com/office/drawing/2014/main" id="{C49944E6-B415-4E8E-C5DA-56BD5A17EE93}"/>
+              </a:ext>
+            </a:extLst>
+          </p:cNvPr>
+          <p:cNvSpPr/>
+          <p:nvPr/>
+        </p:nvSpPr>
+        <p:spPr>
+          <a:xfrm rot="5400000">
+            <a:off x="17618955" y="15299739"/>
+            <a:ext cx="1248473" cy="7466729"/>
+          </a:xfrm>
+          <a:prstGeom prst="rightBrace">
+            <a:avLst>
+              <a:gd name="adj1" fmla="val 8333"/>
+              <a:gd name="adj2" fmla="val 56676"/>
+            </a:avLst>
+          </a:prstGeom>
+          <a:ln w="50800">
+            <a:solidFill>
+              <a:schemeClr val="tx1">
+                <a:lumMod val="50000"/>
+                <a:lumOff val="50000"/>
+              </a:schemeClr>
+            </a:solidFill>
+          </a:ln>
+        </p:spPr>
+        <p:style>
+          <a:lnRef idx="1">
+            <a:schemeClr val="accent1"/>
+          </a:lnRef>
+          <a:fillRef idx="0">
+            <a:schemeClr val="accent1"/>
+          </a:fillRef>
+          <a:effectRef idx="0">
+            <a:schemeClr val="accent1"/>
+          </a:effectRef>
+          <a:fontRef idx="minor">
+            <a:schemeClr val="tx1"/>
+          </a:fontRef>
+        </p:style>
+        <p:txBody>
+          <a:bodyPr rtlCol="0" anchor="ctr"/>
+          <a:lstStyle/>
+          <a:p>
+            <a:pPr algn="ctr"/>
+            <a:endParaRPr lang="en-US"/>
+          </a:p>
+        </p:txBody>
+      </p:sp>
+      <p:cxnSp>
+        <p:nvCxnSpPr>
+          <p:cNvPr id="104" name="Straight Connector 103">
+            <a:extLst>
+              <a:ext uri="{FF2B5EF4-FFF2-40B4-BE49-F238E27FC236}">
+                <a16:creationId xmlns:a16="http://schemas.microsoft.com/office/drawing/2014/main" id="{5836C0E9-C2E4-650C-7AC3-0CA9E7B2122E}"/>
+              </a:ext>
+            </a:extLst>
+          </p:cNvPr>
+          <p:cNvCxnSpPr>
+            <a:cxnSpLocks/>
+            <a:stCxn id="3" idx="1"/>
+          </p:cNvCxnSpPr>
+          <p:nvPr/>
+        </p:nvCxnSpPr>
+        <p:spPr>
+          <a:xfrm flipH="1">
+            <a:off x="16248678" y="19657340"/>
+            <a:ext cx="1496035" cy="916348"/>
+          </a:xfrm>
+          <a:prstGeom prst="line">
+            <a:avLst/>
+          </a:prstGeom>
+          <a:ln w="50800">
+            <a:solidFill>
+              <a:schemeClr val="tx1">
+                <a:lumMod val="50000"/>
+                <a:lumOff val="50000"/>
+              </a:schemeClr>
+            </a:solidFill>
+          </a:ln>
+        </p:spPr>
+        <p:style>
+          <a:lnRef idx="1">
+            <a:schemeClr val="accent2"/>
+          </a:lnRef>
+          <a:fillRef idx="0">
+            <a:schemeClr val="accent2"/>
+          </a:fillRef>
+          <a:effectRef idx="0">
+            <a:schemeClr val="accent2"/>
+          </a:effectRef>
+          <a:fontRef idx="minor">
+            <a:schemeClr val="tx1"/>
+          </a:fontRef>
+        </p:style>
+      </p:cxnSp>
+      <p:cxnSp>
+        <p:nvCxnSpPr>
+          <p:cNvPr id="110" name="Straight Connector 109">
+            <a:extLst>
+              <a:ext uri="{FF2B5EF4-FFF2-40B4-BE49-F238E27FC236}">
+                <a16:creationId xmlns:a16="http://schemas.microsoft.com/office/drawing/2014/main" id="{86256070-6713-8F5F-F286-1C62D71308BE}"/>
+              </a:ext>
+            </a:extLst>
+          </p:cNvPr>
+          <p:cNvCxnSpPr>
+            <a:cxnSpLocks/>
+          </p:cNvCxnSpPr>
+          <p:nvPr/>
+        </p:nvCxnSpPr>
+        <p:spPr>
+          <a:xfrm>
+            <a:off x="17742078" y="19656467"/>
+            <a:ext cx="2807279" cy="711189"/>
+          </a:xfrm>
+          <a:prstGeom prst="line">
+            <a:avLst/>
+          </a:prstGeom>
+          <a:ln w="50800">
+            <a:solidFill>
+              <a:schemeClr val="tx1">
+                <a:lumMod val="50000"/>
+                <a:lumOff val="50000"/>
+              </a:schemeClr>
+            </a:solidFill>
+          </a:ln>
+        </p:spPr>
+        <p:style>
+          <a:lnRef idx="1">
+            <a:schemeClr val="accent2"/>
+          </a:lnRef>
+          <a:fillRef idx="0">
+            <a:schemeClr val="accent2"/>
+          </a:fillRef>
+          <a:effectRef idx="0">
+            <a:schemeClr val="accent2"/>
+          </a:effectRef>
+          <a:fontRef idx="minor">
+            <a:schemeClr val="tx1"/>
+          </a:fontRef>
+        </p:style>
+      </p:cxnSp>
+      <p:sp>
+        <p:nvSpPr>
+          <p:cNvPr id="2" name="TextBox 1">
+            <a:extLst>
+              <a:ext uri="{FF2B5EF4-FFF2-40B4-BE49-F238E27FC236}">
+                <a16:creationId xmlns:a16="http://schemas.microsoft.com/office/drawing/2014/main" id="{B779B2B3-AF8D-5285-4B47-DDAB637037A0}"/>
+              </a:ext>
+            </a:extLst>
+          </p:cNvPr>
+          <p:cNvSpPr txBox="1"/>
+          <p:nvPr/>
+        </p:nvSpPr>
+        <p:spPr>
+          <a:xfrm>
+            <a:off x="15533217" y="18246273"/>
+            <a:ext cx="5343504" cy="1446550"/>
+          </a:xfrm>
+          <a:prstGeom prst="rect">
+            <a:avLst/>
+          </a:prstGeom>
+          <a:solidFill>
+            <a:schemeClr val="bg1">
+              <a:alpha val="54000"/>
+            </a:schemeClr>
+          </a:solidFill>
+        </p:spPr>
+        <p:txBody>
+          <a:bodyPr wrap="square" rtlCol="0">
+            <a:spAutoFit/>
+          </a:bodyPr>
+          <a:lstStyle/>
+          <a:p>
+            <a:pPr algn="ctr"/>
+            <a:r>
+              <a:rPr lang="en-US" sz="4400" i="1" dirty="0">
+                <a:solidFill>
+                  <a:schemeClr val="tx1">
+                    <a:lumMod val="50000"/>
+                    <a:lumOff val="50000"/>
+                  </a:schemeClr>
+                </a:solidFill>
+              </a:rPr>
+              <a:t>(</a:t>
+            </a:r>
+            <a:r>
+              <a:rPr lang="en-US" sz="4400" i="1" dirty="0" err="1">
+                <a:solidFill>
+                  <a:schemeClr val="tx1">
+                    <a:lumMod val="50000"/>
+                    <a:lumOff val="50000"/>
+                  </a:schemeClr>
+                </a:solidFill>
+              </a:rPr>
+              <a:t>FaIR</a:t>
+            </a:r>
+            <a:r>
+              <a:rPr lang="en-US" sz="4400" i="1" dirty="0">
+                <a:solidFill>
+                  <a:schemeClr val="tx1">
+                    <a:lumMod val="50000"/>
+                    <a:lumOff val="50000"/>
+                  </a:schemeClr>
+                </a:solidFill>
+              </a:rPr>
+              <a:t> used within each GWI compartment)</a:t>
+            </a:r>
+          </a:p>
+        </p:txBody>
+      </p:sp>
+      <p:cxnSp>
+        <p:nvCxnSpPr>
+          <p:cNvPr id="240" name="Straight Connector 239">
+            <a:extLst>
+              <a:ext uri="{FF2B5EF4-FFF2-40B4-BE49-F238E27FC236}">
+                <a16:creationId xmlns:a16="http://schemas.microsoft.com/office/drawing/2014/main" id="{F86D76EA-8C5C-444C-3204-A6DD72A46116}"/>
+              </a:ext>
+            </a:extLst>
+          </p:cNvPr>
+          <p:cNvCxnSpPr>
+            <a:cxnSpLocks/>
+          </p:cNvCxnSpPr>
+          <p:nvPr/>
+        </p:nvCxnSpPr>
+        <p:spPr>
+          <a:xfrm flipV="1">
+            <a:off x="23745046" y="14587044"/>
+            <a:ext cx="5809936" cy="4942406"/>
+          </a:xfrm>
+          <a:prstGeom prst="line">
+            <a:avLst/>
+          </a:prstGeom>
+          <a:ln w="63500">
+            <a:solidFill>
+              <a:schemeClr val="tx1">
+                <a:lumMod val="50000"/>
+                <a:lumOff val="50000"/>
+              </a:schemeClr>
+            </a:solidFill>
+            <a:prstDash val="dash"/>
+          </a:ln>
+        </p:spPr>
+        <p:style>
+          <a:lnRef idx="1">
+            <a:schemeClr val="dk1"/>
+          </a:lnRef>
+          <a:fillRef idx="0">
+            <a:schemeClr val="dk1"/>
+          </a:fillRef>
+          <a:effectRef idx="0">
+            <a:schemeClr val="dk1"/>
+          </a:effectRef>
+          <a:fontRef idx="minor">
+            <a:schemeClr val="tx1"/>
+          </a:fontRef>
+        </p:style>
+      </p:cxnSp>
+      <p:sp>
+        <p:nvSpPr>
+          <p:cNvPr id="256" name="Freeform 255">
+            <a:extLst>
+              <a:ext uri="{FF2B5EF4-FFF2-40B4-BE49-F238E27FC236}">
+                <a16:creationId xmlns:a16="http://schemas.microsoft.com/office/drawing/2014/main" id="{F4BF7989-DE3C-EBFB-C082-953C87EEFCBF}"/>
+              </a:ext>
+            </a:extLst>
+          </p:cNvPr>
+          <p:cNvSpPr/>
+          <p:nvPr/>
+        </p:nvSpPr>
+        <p:spPr>
+          <a:xfrm>
+            <a:off x="21767800" y="19227800"/>
+            <a:ext cx="2152410" cy="4977167"/>
+          </a:xfrm>
+          <a:custGeom>
+            <a:avLst/>
+            <a:gdLst>
+              <a:gd name="connsiteX0" fmla="*/ 863600 w 2152410"/>
+              <a:gd name="connsiteY0" fmla="*/ 5892800 h 5892800"/>
+              <a:gd name="connsiteX1" fmla="*/ 2133600 w 2152410"/>
+              <a:gd name="connsiteY1" fmla="*/ 914400 h 5892800"/>
+              <a:gd name="connsiteX2" fmla="*/ 0 w 2152410"/>
+              <a:gd name="connsiteY2" fmla="*/ 0 h 5892800"/>
+            </a:gdLst>
+            <a:ahLst/>
+            <a:cxnLst>
+              <a:cxn ang="0">
+                <a:pos x="connsiteX0" y="connsiteY0"/>
+              </a:cxn>
+              <a:cxn ang="0">
+                <a:pos x="connsiteX1" y="connsiteY1"/>
+              </a:cxn>
+              <a:cxn ang="0">
+                <a:pos x="connsiteX2" y="connsiteY2"/>
+              </a:cxn>
+            </a:cxnLst>
+            <a:rect l="l" t="t" r="r" b="b"/>
+            <a:pathLst>
+              <a:path w="2152410" h="5892800">
+                <a:moveTo>
+                  <a:pt x="863600" y="5892800"/>
+                </a:moveTo>
+                <a:cubicBezTo>
+                  <a:pt x="1570566" y="3894666"/>
+                  <a:pt x="2277533" y="1896533"/>
+                  <a:pt x="2133600" y="914400"/>
+                </a:cubicBezTo>
+                <a:cubicBezTo>
+                  <a:pt x="1989667" y="-67733"/>
+                  <a:pt x="558800" y="21167"/>
+                  <a:pt x="0" y="0"/>
+                </a:cubicBezTo>
+              </a:path>
+            </a:pathLst>
+          </a:custGeom>
+          <a:noFill/>
+          <a:ln w="63500">
+            <a:solidFill>
+              <a:schemeClr val="tx1">
+                <a:lumMod val="50000"/>
+                <a:lumOff val="50000"/>
+              </a:schemeClr>
+            </a:solidFill>
+          </a:ln>
+        </p:spPr>
+        <p:style>
+          <a:lnRef idx="2">
+            <a:schemeClr val="accent1">
+              <a:shade val="15000"/>
+            </a:schemeClr>
+          </a:lnRef>
+          <a:fillRef idx="1">
+            <a:schemeClr val="accent1"/>
+          </a:fillRef>
+          <a:effectRef idx="0">
+            <a:schemeClr val="accent1"/>
+          </a:effectRef>
+          <a:fontRef idx="minor">
+            <a:schemeClr val="lt1"/>
+          </a:fontRef>
+        </p:style>
+        <p:txBody>
+          <a:bodyPr rtlCol="0" anchor="ctr"/>
+          <a:lstStyle/>
+          <a:p>
+            <a:pPr algn="ctr"/>
+            <a:endParaRPr lang="en-US"/>
+          </a:p>
+        </p:txBody>
+      </p:sp>
+      <p:sp>
+        <p:nvSpPr>
+          <p:cNvPr id="262" name="TextBox 261">
+            <a:extLst>
+              <a:ext uri="{FF2B5EF4-FFF2-40B4-BE49-F238E27FC236}">
+                <a16:creationId xmlns:a16="http://schemas.microsoft.com/office/drawing/2014/main" id="{74FE9E42-D0FB-8C5C-FBC3-35A36BA30619}"/>
+              </a:ext>
+            </a:extLst>
+          </p:cNvPr>
+          <p:cNvSpPr txBox="1"/>
+          <p:nvPr/>
+        </p:nvSpPr>
+        <p:spPr>
+          <a:xfrm>
+            <a:off x="22200344" y="23194423"/>
+            <a:ext cx="4061036" cy="646331"/>
+          </a:xfrm>
+          <a:prstGeom prst="rect">
+            <a:avLst/>
+          </a:prstGeom>
+          <a:solidFill>
+            <a:schemeClr val="bg1">
+              <a:alpha val="54000"/>
+            </a:schemeClr>
+          </a:solidFill>
+        </p:spPr>
+        <p:txBody>
+          <a:bodyPr wrap="square" rtlCol="0">
+            <a:spAutoFit/>
+          </a:bodyPr>
+          <a:lstStyle/>
+          <a:p>
+            <a:pPr algn="ctr"/>
+            <a:r>
+              <a:rPr lang="en-US" sz="3600" i="1" dirty="0">
+                <a:solidFill>
+                  <a:schemeClr val="tx1">
+                    <a:lumMod val="50000"/>
+                    <a:lumOff val="50000"/>
+                  </a:schemeClr>
+                </a:solidFill>
+              </a:rPr>
+              <a:t>Fast adjust: ~4.1 </a:t>
+            </a:r>
+            <a:r>
+              <a:rPr lang="en-US" sz="3600" i="1" dirty="0" err="1">
+                <a:solidFill>
+                  <a:schemeClr val="tx1">
+                    <a:lumMod val="50000"/>
+                    <a:lumOff val="50000"/>
+                  </a:schemeClr>
+                </a:solidFill>
+              </a:rPr>
+              <a:t>yrs</a:t>
+            </a:r>
+            <a:endParaRPr lang="en-US" sz="3600" i="1" dirty="0">
+              <a:solidFill>
+                <a:schemeClr val="tx1">
+                  <a:lumMod val="50000"/>
+                  <a:lumOff val="50000"/>
+                </a:schemeClr>
+              </a:solidFill>
+            </a:endParaRPr>
+          </a:p>
+        </p:txBody>
+      </p:sp>
+      <p:sp>
+        <p:nvSpPr>
+          <p:cNvPr id="264" name="TextBox 263">
+            <a:extLst>
+              <a:ext uri="{FF2B5EF4-FFF2-40B4-BE49-F238E27FC236}">
+                <a16:creationId xmlns:a16="http://schemas.microsoft.com/office/drawing/2014/main" id="{F61AC655-78BD-07A2-2162-A5060E9E7970}"/>
+              </a:ext>
+            </a:extLst>
+          </p:cNvPr>
+          <p:cNvSpPr txBox="1"/>
+          <p:nvPr/>
+        </p:nvSpPr>
+        <p:spPr>
+          <a:xfrm>
+            <a:off x="22132447" y="24490893"/>
+            <a:ext cx="4277658" cy="646331"/>
+          </a:xfrm>
+          <a:prstGeom prst="rect">
+            <a:avLst/>
+          </a:prstGeom>
+          <a:solidFill>
+            <a:schemeClr val="bg1">
+              <a:alpha val="54000"/>
+            </a:schemeClr>
+          </a:solidFill>
+        </p:spPr>
+        <p:txBody>
+          <a:bodyPr wrap="square" rtlCol="0">
+            <a:spAutoFit/>
+          </a:bodyPr>
+          <a:lstStyle/>
+          <a:p>
+            <a:pPr algn="ctr"/>
+            <a:r>
+              <a:rPr lang="en-US" sz="3600" i="1" dirty="0">
+                <a:solidFill>
+                  <a:schemeClr val="tx1">
+                    <a:lumMod val="50000"/>
+                    <a:lumOff val="50000"/>
+                  </a:schemeClr>
+                </a:solidFill>
+              </a:rPr>
+              <a:t>Slow adjust: ~209 </a:t>
+            </a:r>
+            <a:r>
+              <a:rPr lang="en-US" sz="3600" i="1" dirty="0" err="1">
+                <a:solidFill>
+                  <a:schemeClr val="tx1">
+                    <a:lumMod val="50000"/>
+                    <a:lumOff val="50000"/>
+                  </a:schemeClr>
+                </a:solidFill>
+              </a:rPr>
+              <a:t>yrs</a:t>
+            </a:r>
+            <a:endParaRPr lang="en-US" sz="3600" i="1" dirty="0">
+              <a:solidFill>
+                <a:schemeClr val="tx1">
+                  <a:lumMod val="50000"/>
+                  <a:lumOff val="50000"/>
+                </a:schemeClr>
+              </a:solidFill>
+            </a:endParaRPr>
+          </a:p>
+        </p:txBody>
+      </p:sp>
     </p:spTree>
     <p:extLst>
       <p:ext uri="{BB962C8B-B14F-4D97-AF65-F5344CB8AC3E}">

</xml_diff>